<commit_message>
Improving markdowns and presentations- adding predictive recommendations to conclusion
</commit_message>
<xml_diff>
--- a/Deliverables/Predictive Maintenance of Water Pumps in Tanzania-Presentation.pptx
+++ b/Deliverables/Predictive Maintenance of Water Pumps in Tanzania-Presentation.pptx
@@ -25,23 +25,26 @@
     <p:sldId id="270" r:id="rId20"/>
     <p:sldId id="271" r:id="rId21"/>
     <p:sldId id="272" r:id="rId22"/>
+    <p:sldId id="273" r:id="rId23"/>
+    <p:sldId id="274" r:id="rId24"/>
+    <p:sldId id="275" r:id="rId25"/>
   </p:sldIdLst>
   <p:sldSz cy="5143500" cx="9144000"/>
   <p:notesSz cx="6858000" cy="9144000"/>
   <p:embeddedFontLst>
     <p:embeddedFont>
       <p:font typeface="Anaheim"/>
-      <p:regular r:id="rId23"/>
-      <p:bold r:id="rId24"/>
+      <p:regular r:id="rId26"/>
+      <p:bold r:id="rId27"/>
     </p:embeddedFont>
     <p:embeddedFont>
       <p:font typeface="Bebas Neue"/>
-      <p:regular r:id="rId25"/>
+      <p:regular r:id="rId28"/>
     </p:embeddedFont>
     <p:embeddedFont>
       <p:font typeface="Comfortaa"/>
-      <p:regular r:id="rId26"/>
-      <p:bold r:id="rId27"/>
+      <p:regular r:id="rId29"/>
+      <p:bold r:id="rId30"/>
     </p:embeddedFont>
   </p:embeddedFontLst>
   <p:defaultTextStyle>
@@ -1331,7 +1334,7 @@
       </p:grpSpPr>
       <p:sp>
         <p:nvSpPr>
-          <p:cNvPr id="336" name="Google Shape;336;g2f83153f5f0_0_58:notes"/>
+          <p:cNvPr id="336" name="Google Shape;336;g2faf7f0d875_0_0:notes"/>
           <p:cNvSpPr/>
           <p:nvPr>
             <p:ph idx="2" type="sldImg"/>
@@ -1366,7 +1369,7 @@
       </p:sp>
       <p:sp>
         <p:nvSpPr>
-          <p:cNvPr id="337" name="Google Shape;337;g2f83153f5f0_0_58:notes"/>
+          <p:cNvPr id="337" name="Google Shape;337;g2faf7f0d875_0_0:notes"/>
           <p:cNvSpPr txBox="1"/>
           <p:nvPr>
             <p:ph idx="1" type="body"/>
@@ -1430,7 +1433,7 @@
       </p:grpSpPr>
       <p:sp>
         <p:nvSpPr>
-          <p:cNvPr id="342" name="Google Shape;342;g2f83153f5f0_0_64:notes"/>
+          <p:cNvPr id="342" name="Google Shape;342;g2faf7f0d875_0_6:notes"/>
           <p:cNvSpPr/>
           <p:nvPr>
             <p:ph idx="2" type="sldImg"/>
@@ -1465,7 +1468,7 @@
       </p:sp>
       <p:sp>
         <p:nvSpPr>
-          <p:cNvPr id="343" name="Google Shape;343;g2f83153f5f0_0_64:notes"/>
+          <p:cNvPr id="343" name="Google Shape;343;g2faf7f0d875_0_6:notes"/>
           <p:cNvSpPr txBox="1"/>
           <p:nvPr>
             <p:ph idx="1" type="body"/>
@@ -1529,7 +1532,7 @@
       </p:grpSpPr>
       <p:sp>
         <p:nvSpPr>
-          <p:cNvPr id="348" name="Google Shape;348;g2f83153f5f0_0_71:notes"/>
+          <p:cNvPr id="348" name="Google Shape;348;g2f83153f5f0_0_58:notes"/>
           <p:cNvSpPr/>
           <p:nvPr>
             <p:ph idx="2" type="sldImg"/>
@@ -1564,7 +1567,205 @@
       </p:sp>
       <p:sp>
         <p:nvSpPr>
-          <p:cNvPr id="349" name="Google Shape;349;g2f83153f5f0_0_71:notes"/>
+          <p:cNvPr id="349" name="Google Shape;349;g2f83153f5f0_0_58:notes"/>
+          <p:cNvSpPr txBox="1"/>
+          <p:nvPr>
+            <p:ph idx="1" type="body"/>
+          </p:nvPr>
+        </p:nvSpPr>
+        <p:spPr>
+          <a:xfrm>
+            <a:off x="685800" y="4343400"/>
+            <a:ext cx="5486400" cy="4114800"/>
+          </a:xfrm>
+          <a:prstGeom prst="rect">
+            <a:avLst/>
+          </a:prstGeom>
+        </p:spPr>
+        <p:txBody>
+          <a:bodyPr anchorCtr="0" anchor="t" bIns="91425" lIns="91425" spcFirstLastPara="1" rIns="91425" wrap="square" tIns="91425">
+            <a:noAutofit/>
+          </a:bodyPr>
+          <a:lstStyle/>
+          <a:p>
+            <a:pPr indent="0" lvl="0" marL="0" rtl="0" algn="l">
+              <a:spcBef>
+                <a:spcPts val="0"/>
+              </a:spcBef>
+              <a:spcAft>
+                <a:spcPts val="0"/>
+              </a:spcAft>
+              <a:buNone/>
+            </a:pPr>
+            <a:r>
+              <a:t/>
+            </a:r>
+            <a:endParaRPr/>
+          </a:p>
+        </p:txBody>
+      </p:sp>
+    </p:spTree>
+  </p:cSld>
+  <p:clrMapOvr>
+    <a:masterClrMapping/>
+  </p:clrMapOvr>
+</p:notes>
+</file>
+
+<file path=ppt/notesSlides/notesSlide18.xml><?xml version="1.0" encoding="utf-8"?>
+<p:notes xmlns:a="http://schemas.openxmlformats.org/drawingml/2006/main" xmlns:r="http://schemas.openxmlformats.org/officeDocument/2006/relationships" xmlns:mc="http://schemas.openxmlformats.org/markup-compatibility/2006" xmlns:mv="urn:schemas-microsoft-com:mac:vml" xmlns:p="http://schemas.openxmlformats.org/presentationml/2006/main" xmlns:c="http://schemas.openxmlformats.org/drawingml/2006/chart" xmlns:dgm="http://schemas.openxmlformats.org/drawingml/2006/diagram" xmlns:o="urn:schemas-microsoft-com:office:office" xmlns:v="urn:schemas-microsoft-com:vml" xmlns:pvml="urn:schemas-microsoft-com:office:powerpoint" xmlns:com="http://schemas.openxmlformats.org/drawingml/2006/compatibility" xmlns:p14="http://schemas.microsoft.com/office/powerpoint/2010/main" xmlns:p15="http://schemas.microsoft.com/office/powerpoint/2012/main" xmlns:ahyp="http://schemas.microsoft.com/office/drawing/2018/hyperlinkcolor" showMasterPhAnim="0" showMasterSp="0">
+  <p:cSld>
+    <p:spTree>
+      <p:nvGrpSpPr>
+        <p:cNvPr id="353" name="Shape 353"/>
+        <p:cNvGrpSpPr/>
+        <p:nvPr/>
+      </p:nvGrpSpPr>
+      <p:grpSpPr>
+        <a:xfrm>
+          <a:off x="0" y="0"/>
+          <a:ext cx="0" cy="0"/>
+          <a:chOff x="0" y="0"/>
+          <a:chExt cx="0" cy="0"/>
+        </a:xfrm>
+      </p:grpSpPr>
+      <p:sp>
+        <p:nvSpPr>
+          <p:cNvPr id="354" name="Google Shape;354;g2f83153f5f0_0_64:notes"/>
+          <p:cNvSpPr/>
+          <p:nvPr>
+            <p:ph idx="2" type="sldImg"/>
+          </p:nvPr>
+        </p:nvSpPr>
+        <p:spPr>
+          <a:xfrm>
+            <a:off x="381300" y="685800"/>
+            <a:ext cx="6096000" cy="3429000"/>
+          </a:xfrm>
+          <a:custGeom>
+            <a:rect b="b" l="l" r="r" t="t"/>
+            <a:pathLst>
+              <a:path extrusionOk="0" h="120000" w="120000">
+                <a:moveTo>
+                  <a:pt x="0" y="0"/>
+                </a:moveTo>
+                <a:lnTo>
+                  <a:pt x="120000" y="0"/>
+                </a:lnTo>
+                <a:lnTo>
+                  <a:pt x="120000" y="120000"/>
+                </a:lnTo>
+                <a:lnTo>
+                  <a:pt x="0" y="120000"/>
+                </a:lnTo>
+                <a:close/>
+              </a:path>
+            </a:pathLst>
+          </a:custGeom>
+        </p:spPr>
+      </p:sp>
+      <p:sp>
+        <p:nvSpPr>
+          <p:cNvPr id="355" name="Google Shape;355;g2f83153f5f0_0_64:notes"/>
+          <p:cNvSpPr txBox="1"/>
+          <p:nvPr>
+            <p:ph idx="1" type="body"/>
+          </p:nvPr>
+        </p:nvSpPr>
+        <p:spPr>
+          <a:xfrm>
+            <a:off x="685800" y="4343400"/>
+            <a:ext cx="5486400" cy="4114800"/>
+          </a:xfrm>
+          <a:prstGeom prst="rect">
+            <a:avLst/>
+          </a:prstGeom>
+        </p:spPr>
+        <p:txBody>
+          <a:bodyPr anchorCtr="0" anchor="t" bIns="91425" lIns="91425" spcFirstLastPara="1" rIns="91425" wrap="square" tIns="91425">
+            <a:noAutofit/>
+          </a:bodyPr>
+          <a:lstStyle/>
+          <a:p>
+            <a:pPr indent="0" lvl="0" marL="0" rtl="0" algn="l">
+              <a:spcBef>
+                <a:spcPts val="0"/>
+              </a:spcBef>
+              <a:spcAft>
+                <a:spcPts val="0"/>
+              </a:spcAft>
+              <a:buNone/>
+            </a:pPr>
+            <a:r>
+              <a:t/>
+            </a:r>
+            <a:endParaRPr/>
+          </a:p>
+        </p:txBody>
+      </p:sp>
+    </p:spTree>
+  </p:cSld>
+  <p:clrMapOvr>
+    <a:masterClrMapping/>
+  </p:clrMapOvr>
+</p:notes>
+</file>
+
+<file path=ppt/notesSlides/notesSlide19.xml><?xml version="1.0" encoding="utf-8"?>
+<p:notes xmlns:a="http://schemas.openxmlformats.org/drawingml/2006/main" xmlns:r="http://schemas.openxmlformats.org/officeDocument/2006/relationships" xmlns:mc="http://schemas.openxmlformats.org/markup-compatibility/2006" xmlns:mv="urn:schemas-microsoft-com:mac:vml" xmlns:p="http://schemas.openxmlformats.org/presentationml/2006/main" xmlns:c="http://schemas.openxmlformats.org/drawingml/2006/chart" xmlns:dgm="http://schemas.openxmlformats.org/drawingml/2006/diagram" xmlns:o="urn:schemas-microsoft-com:office:office" xmlns:v="urn:schemas-microsoft-com:vml" xmlns:pvml="urn:schemas-microsoft-com:office:powerpoint" xmlns:com="http://schemas.openxmlformats.org/drawingml/2006/compatibility" xmlns:p14="http://schemas.microsoft.com/office/powerpoint/2010/main" xmlns:p15="http://schemas.microsoft.com/office/powerpoint/2012/main" xmlns:ahyp="http://schemas.microsoft.com/office/drawing/2018/hyperlinkcolor" showMasterPhAnim="0" showMasterSp="0">
+  <p:cSld>
+    <p:spTree>
+      <p:nvGrpSpPr>
+        <p:cNvPr id="359" name="Shape 359"/>
+        <p:cNvGrpSpPr/>
+        <p:nvPr/>
+      </p:nvGrpSpPr>
+      <p:grpSpPr>
+        <a:xfrm>
+          <a:off x="0" y="0"/>
+          <a:ext cx="0" cy="0"/>
+          <a:chOff x="0" y="0"/>
+          <a:chExt cx="0" cy="0"/>
+        </a:xfrm>
+      </p:grpSpPr>
+      <p:sp>
+        <p:nvSpPr>
+          <p:cNvPr id="360" name="Google Shape;360;g2f83153f5f0_0_71:notes"/>
+          <p:cNvSpPr/>
+          <p:nvPr>
+            <p:ph idx="2" type="sldImg"/>
+          </p:nvPr>
+        </p:nvSpPr>
+        <p:spPr>
+          <a:xfrm>
+            <a:off x="381300" y="685800"/>
+            <a:ext cx="6096000" cy="3429000"/>
+          </a:xfrm>
+          <a:custGeom>
+            <a:rect b="b" l="l" r="r" t="t"/>
+            <a:pathLst>
+              <a:path extrusionOk="0" h="120000" w="120000">
+                <a:moveTo>
+                  <a:pt x="0" y="0"/>
+                </a:moveTo>
+                <a:lnTo>
+                  <a:pt x="120000" y="0"/>
+                </a:lnTo>
+                <a:lnTo>
+                  <a:pt x="120000" y="120000"/>
+                </a:lnTo>
+                <a:lnTo>
+                  <a:pt x="0" y="120000"/>
+                </a:lnTo>
+                <a:close/>
+              </a:path>
+            </a:pathLst>
+          </a:custGeom>
+        </p:spPr>
+      </p:sp>
+      <p:sp>
+        <p:nvSpPr>
+          <p:cNvPr id="361" name="Google Shape;361;g2f83153f5f0_0_71:notes"/>
           <p:cNvSpPr txBox="1"/>
           <p:nvPr>
             <p:ph idx="1" type="body"/>
@@ -1664,6 +1865,105 @@
       <p:sp>
         <p:nvSpPr>
           <p:cNvPr id="257" name="Google Shape;257;g2f83153f5f0_0_2:notes"/>
+          <p:cNvSpPr txBox="1"/>
+          <p:nvPr>
+            <p:ph idx="1" type="body"/>
+          </p:nvPr>
+        </p:nvSpPr>
+        <p:spPr>
+          <a:xfrm>
+            <a:off x="685800" y="4343400"/>
+            <a:ext cx="5486400" cy="4114800"/>
+          </a:xfrm>
+          <a:prstGeom prst="rect">
+            <a:avLst/>
+          </a:prstGeom>
+        </p:spPr>
+        <p:txBody>
+          <a:bodyPr anchorCtr="0" anchor="t" bIns="91425" lIns="91425" spcFirstLastPara="1" rIns="91425" wrap="square" tIns="91425">
+            <a:noAutofit/>
+          </a:bodyPr>
+          <a:lstStyle/>
+          <a:p>
+            <a:pPr indent="0" lvl="0" marL="0" rtl="0" algn="l">
+              <a:spcBef>
+                <a:spcPts val="0"/>
+              </a:spcBef>
+              <a:spcAft>
+                <a:spcPts val="0"/>
+              </a:spcAft>
+              <a:buNone/>
+            </a:pPr>
+            <a:r>
+              <a:t/>
+            </a:r>
+            <a:endParaRPr/>
+          </a:p>
+        </p:txBody>
+      </p:sp>
+    </p:spTree>
+  </p:cSld>
+  <p:clrMapOvr>
+    <a:masterClrMapping/>
+  </p:clrMapOvr>
+</p:notes>
+</file>
+
+<file path=ppt/notesSlides/notesSlide20.xml><?xml version="1.0" encoding="utf-8"?>
+<p:notes xmlns:a="http://schemas.openxmlformats.org/drawingml/2006/main" xmlns:r="http://schemas.openxmlformats.org/officeDocument/2006/relationships" xmlns:mc="http://schemas.openxmlformats.org/markup-compatibility/2006" xmlns:mv="urn:schemas-microsoft-com:mac:vml" xmlns:p="http://schemas.openxmlformats.org/presentationml/2006/main" xmlns:c="http://schemas.openxmlformats.org/drawingml/2006/chart" xmlns:dgm="http://schemas.openxmlformats.org/drawingml/2006/diagram" xmlns:o="urn:schemas-microsoft-com:office:office" xmlns:v="urn:schemas-microsoft-com:vml" xmlns:pvml="urn:schemas-microsoft-com:office:powerpoint" xmlns:com="http://schemas.openxmlformats.org/drawingml/2006/compatibility" xmlns:p14="http://schemas.microsoft.com/office/powerpoint/2010/main" xmlns:p15="http://schemas.microsoft.com/office/powerpoint/2012/main" xmlns:ahyp="http://schemas.microsoft.com/office/drawing/2018/hyperlinkcolor" showMasterPhAnim="0" showMasterSp="0">
+  <p:cSld>
+    <p:spTree>
+      <p:nvGrpSpPr>
+        <p:cNvPr id="365" name="Shape 365"/>
+        <p:cNvGrpSpPr/>
+        <p:nvPr/>
+      </p:nvGrpSpPr>
+      <p:grpSpPr>
+        <a:xfrm>
+          <a:off x="0" y="0"/>
+          <a:ext cx="0" cy="0"/>
+          <a:chOff x="0" y="0"/>
+          <a:chExt cx="0" cy="0"/>
+        </a:xfrm>
+      </p:grpSpPr>
+      <p:sp>
+        <p:nvSpPr>
+          <p:cNvPr id="366" name="Google Shape;366;g2faf7f0d875_0_11:notes"/>
+          <p:cNvSpPr/>
+          <p:nvPr>
+            <p:ph idx="2" type="sldImg"/>
+          </p:nvPr>
+        </p:nvSpPr>
+        <p:spPr>
+          <a:xfrm>
+            <a:off x="381300" y="685800"/>
+            <a:ext cx="6096000" cy="3429000"/>
+          </a:xfrm>
+          <a:custGeom>
+            <a:rect b="b" l="l" r="r" t="t"/>
+            <a:pathLst>
+              <a:path extrusionOk="0" h="120000" w="120000">
+                <a:moveTo>
+                  <a:pt x="0" y="0"/>
+                </a:moveTo>
+                <a:lnTo>
+                  <a:pt x="120000" y="0"/>
+                </a:lnTo>
+                <a:lnTo>
+                  <a:pt x="120000" y="120000"/>
+                </a:lnTo>
+                <a:lnTo>
+                  <a:pt x="0" y="120000"/>
+                </a:lnTo>
+                <a:close/>
+              </a:path>
+            </a:pathLst>
+          </a:custGeom>
+        </p:spPr>
+      </p:sp>
+      <p:sp>
+        <p:nvSpPr>
+          <p:cNvPr id="367" name="Google Shape;367;g2faf7f0d875_0_11:notes"/>
           <p:cNvSpPr txBox="1"/>
           <p:nvPr>
             <p:ph idx="1" type="body"/>
@@ -30378,6 +30678,11 @@
               <a:spcAft>
                 <a:spcPts val="0"/>
               </a:spcAft>
+              <a:buClr>
+                <a:schemeClr val="dk1"/>
+              </a:buClr>
+              <a:buSzPts val="1100"/>
+              <a:buFont typeface="Arial"/>
               <a:buNone/>
             </a:pPr>
             <a:r>
@@ -30771,108 +31076,41 @@
           <a:lstStyle/>
           <a:p>
             <a:pPr indent="0" lvl="0" marL="0" rtl="0" algn="l">
-              <a:spcBef>
-                <a:spcPts val="0"/>
-              </a:spcBef>
-              <a:spcAft>
-                <a:spcPts val="0"/>
-              </a:spcAft>
-              <a:buClr>
-                <a:schemeClr val="dk1"/>
-              </a:buClr>
-              <a:buSzPts val="1100"/>
-              <a:buFont typeface="Arial"/>
+              <a:lnSpc>
+                <a:spcPct val="115000"/>
+              </a:lnSpc>
+              <a:spcBef>
+                <a:spcPts val="1200"/>
+              </a:spcBef>
+              <a:spcAft>
+                <a:spcPts val="0"/>
+              </a:spcAft>
               <a:buNone/>
             </a:pPr>
             <a:r>
-              <a:rPr b="1" lang="en-GB" sz="1600">
+              <a:rPr b="1" lang="en-GB">
                 <a:solidFill>
                   <a:schemeClr val="dk2"/>
                 </a:solidFill>
               </a:rPr>
-              <a:t>Model Utility</a:t>
-            </a:r>
-            <a:r>
-              <a:rPr lang="en-GB" sz="1600">
+              <a:t>1. Investigate Zanzibar South (Region Code 11):</a:t>
+            </a:r>
+            <a:br>
+              <a:rPr b="1" lang="en-GB">
                 <a:solidFill>
                   <a:schemeClr val="dk2"/>
                 </a:solidFill>
               </a:rPr>
-              <a:t>:</a:t>
-            </a:r>
-            <a:endParaRPr sz="1600">
-              <a:solidFill>
-                <a:schemeClr val="dk2"/>
-              </a:solidFill>
-            </a:endParaRPr>
-          </a:p>
-          <a:p>
-            <a:pPr indent="-330200" lvl="0" marL="457200" rtl="0" algn="l">
-              <a:spcBef>
-                <a:spcPts val="1200"/>
-              </a:spcBef>
-              <a:spcAft>
-                <a:spcPts val="0"/>
-              </a:spcAft>
-              <a:buClr>
-                <a:schemeClr val="dk2"/>
-              </a:buClr>
-              <a:buSzPts val="1600"/>
-              <a:buChar char="●"/>
-            </a:pPr>
-            <a:r>
-              <a:rPr b="1" lang="en-GB" sz="1600">
+            </a:br>
+            <a:r>
+              <a:rPr lang="en-GB">
                 <a:solidFill>
                   <a:schemeClr val="dk2"/>
                 </a:solidFill>
               </a:rPr>
-              <a:t>Most Useful</a:t>
-            </a:r>
-            <a:r>
-              <a:rPr lang="en-GB" sz="1600">
-                <a:solidFill>
-                  <a:schemeClr val="dk2"/>
-                </a:solidFill>
-              </a:rPr>
-              <a:t>: In rural or remote areas where quick maintenance decisions are crucial. Helps prioritize repairs and maintenance.</a:t>
-            </a:r>
-            <a:endParaRPr sz="1600">
-              <a:solidFill>
-                <a:schemeClr val="dk2"/>
-              </a:solidFill>
-            </a:endParaRPr>
-          </a:p>
-          <a:p>
-            <a:pPr indent="-330200" lvl="0" marL="457200" rtl="0" algn="l">
-              <a:spcBef>
-                <a:spcPts val="1200"/>
-              </a:spcBef>
-              <a:spcAft>
-                <a:spcPts val="0"/>
-              </a:spcAft>
-              <a:buClr>
-                <a:schemeClr val="dk2"/>
-              </a:buClr>
-              <a:buSzPts val="1600"/>
-              <a:buChar char="●"/>
-            </a:pPr>
-            <a:r>
-              <a:rPr b="1" lang="en-GB" sz="1600">
-                <a:solidFill>
-                  <a:schemeClr val="dk2"/>
-                </a:solidFill>
-              </a:rPr>
-              <a:t>Less Effective</a:t>
-            </a:r>
-            <a:r>
-              <a:rPr lang="en-GB" sz="1600">
-                <a:solidFill>
-                  <a:schemeClr val="dk2"/>
-                </a:solidFill>
-              </a:rPr>
-              <a:t>: In rapidly changing conditions or where historical data is outdated.</a:t>
-            </a:r>
-            <a:endParaRPr sz="1600">
+              <a:t>Address regional-specific challenges affecting pump performance to enhance maintenance efforts.</a:t>
+            </a:r>
+            <a:endParaRPr>
               <a:solidFill>
                 <a:schemeClr val="dk2"/>
               </a:solidFill>
@@ -30880,108 +31118,41 @@
           </a:p>
           <a:p>
             <a:pPr indent="0" lvl="0" marL="0" rtl="0" algn="l">
-              <a:spcBef>
-                <a:spcPts val="0"/>
-              </a:spcBef>
-              <a:spcAft>
-                <a:spcPts val="0"/>
-              </a:spcAft>
-              <a:buClr>
-                <a:schemeClr val="dk1"/>
-              </a:buClr>
-              <a:buSzPts val="1100"/>
-              <a:buFont typeface="Arial"/>
+              <a:lnSpc>
+                <a:spcPct val="115000"/>
+              </a:lnSpc>
+              <a:spcBef>
+                <a:spcPts val="1200"/>
+              </a:spcBef>
+              <a:spcAft>
+                <a:spcPts val="0"/>
+              </a:spcAft>
               <a:buNone/>
             </a:pPr>
             <a:r>
-              <a:rPr b="1" lang="en-GB" sz="1600">
+              <a:rPr b="1" lang="en-GB">
                 <a:solidFill>
                   <a:schemeClr val="dk2"/>
                 </a:solidFill>
               </a:rPr>
-              <a:t>Suggestions for Improvement</a:t>
-            </a:r>
-            <a:r>
-              <a:rPr lang="en-GB" sz="1600">
+              <a:t>2. Strengthen Bariadi's Local Government Authority:</a:t>
+            </a:r>
+            <a:br>
+              <a:rPr b="1" lang="en-GB">
                 <a:solidFill>
                   <a:schemeClr val="dk2"/>
                 </a:solidFill>
               </a:rPr>
-              <a:t>:</a:t>
-            </a:r>
-            <a:endParaRPr sz="1600">
-              <a:solidFill>
-                <a:schemeClr val="dk2"/>
-              </a:solidFill>
-            </a:endParaRPr>
-          </a:p>
-          <a:p>
-            <a:pPr indent="-330200" lvl="0" marL="457200" rtl="0" algn="l">
-              <a:spcBef>
-                <a:spcPts val="1200"/>
-              </a:spcBef>
-              <a:spcAft>
-                <a:spcPts val="0"/>
-              </a:spcAft>
-              <a:buClr>
-                <a:schemeClr val="dk2"/>
-              </a:buClr>
-              <a:buSzPts val="1600"/>
-              <a:buChar char="●"/>
-            </a:pPr>
-            <a:r>
-              <a:rPr b="1" lang="en-GB" sz="1600">
+            </a:br>
+            <a:r>
+              <a:rPr lang="en-GB">
                 <a:solidFill>
                   <a:schemeClr val="dk2"/>
                 </a:solidFill>
               </a:rPr>
-              <a:t>Data Accuracy</a:t>
-            </a:r>
-            <a:r>
-              <a:rPr lang="en-GB" sz="1600">
-                <a:solidFill>
-                  <a:schemeClr val="dk2"/>
-                </a:solidFill>
-              </a:rPr>
-              <a:t>: Ensure accurate and up-to-date data on pump conditions and maintenance.</a:t>
-            </a:r>
-            <a:endParaRPr sz="1600">
-              <a:solidFill>
-                <a:schemeClr val="dk2"/>
-              </a:solidFill>
-            </a:endParaRPr>
-          </a:p>
-          <a:p>
-            <a:pPr indent="-330200" lvl="0" marL="457200" rtl="0" algn="l">
-              <a:spcBef>
-                <a:spcPts val="1200"/>
-              </a:spcBef>
-              <a:spcAft>
-                <a:spcPts val="0"/>
-              </a:spcAft>
-              <a:buClr>
-                <a:schemeClr val="dk2"/>
-              </a:buClr>
-              <a:buSzPts val="1600"/>
-              <a:buChar char="●"/>
-            </a:pPr>
-            <a:r>
-              <a:rPr b="1" lang="en-GB" sz="1600">
-                <a:solidFill>
-                  <a:schemeClr val="dk2"/>
-                </a:solidFill>
-              </a:rPr>
-              <a:t>Feature Engineering</a:t>
-            </a:r>
-            <a:r>
-              <a:rPr lang="en-GB" sz="1600">
-                <a:solidFill>
-                  <a:schemeClr val="dk2"/>
-                </a:solidFill>
-              </a:rPr>
-              <a:t>: Add features related to usage patterns, maintenance history, and environmental conditions.</a:t>
-            </a:r>
-            <a:endParaRPr sz="1600">
+              <a:t>Support Bariadi’s LGA with training, resources, and funding to better manage and maintain pumps.</a:t>
+            </a:r>
+            <a:endParaRPr>
               <a:solidFill>
                 <a:schemeClr val="dk2"/>
               </a:solidFill>
@@ -30989,8 +31160,11 @@
           </a:p>
           <a:p>
             <a:pPr indent="0" lvl="0" marL="0" rtl="0" algn="l">
-              <a:spcBef>
-                <a:spcPts val="0"/>
+              <a:lnSpc>
+                <a:spcPct val="115000"/>
+              </a:lnSpc>
+              <a:spcBef>
+                <a:spcPts val="1200"/>
               </a:spcBef>
               <a:spcAft>
                 <a:spcPts val="0"/>
@@ -30998,9 +31172,112 @@
               <a:buNone/>
             </a:pPr>
             <a:r>
+              <a:rPr b="1" lang="en-GB">
+                <a:solidFill>
+                  <a:schemeClr val="dk2"/>
+                </a:solidFill>
+              </a:rPr>
+              <a:t>3. Tailor Maintenance by GPS Height:</a:t>
+            </a:r>
+            <a:br>
+              <a:rPr b="1" lang="en-GB">
+                <a:solidFill>
+                  <a:schemeClr val="dk2"/>
+                </a:solidFill>
+              </a:rPr>
+            </a:br>
+            <a:r>
+              <a:rPr lang="en-GB">
+                <a:solidFill>
+                  <a:schemeClr val="dk2"/>
+                </a:solidFill>
+              </a:rPr>
+              <a:t>Customize maintenance schedules based on pump elevation to address altitude-related issues.</a:t>
+            </a:r>
+            <a:endParaRPr>
+              <a:solidFill>
+                <a:schemeClr val="dk2"/>
+              </a:solidFill>
+            </a:endParaRPr>
+          </a:p>
+          <a:p>
+            <a:pPr indent="0" lvl="0" marL="0" rtl="0" algn="l">
+              <a:lnSpc>
+                <a:spcPct val="115000"/>
+              </a:lnSpc>
+              <a:spcBef>
+                <a:spcPts val="1200"/>
+              </a:spcBef>
+              <a:spcAft>
+                <a:spcPts val="0"/>
+              </a:spcAft>
+              <a:buNone/>
+            </a:pPr>
+            <a:r>
+              <a:rPr b="1" lang="en-GB">
+                <a:solidFill>
+                  <a:schemeClr val="dk2"/>
+                </a:solidFill>
+              </a:rPr>
+              <a:t>4. Focus on Older Pumps:</a:t>
+            </a:r>
+            <a:br>
+              <a:rPr b="1" lang="en-GB">
+                <a:solidFill>
+                  <a:schemeClr val="dk2"/>
+                </a:solidFill>
+              </a:rPr>
+            </a:br>
+            <a:r>
+              <a:rPr lang="en-GB">
+                <a:solidFill>
+                  <a:schemeClr val="dk2"/>
+                </a:solidFill>
+              </a:rPr>
+              <a:t>Implement proactive maintenance strategies for older pumps to extend their lifespan and prevent failures.</a:t>
+            </a:r>
+            <a:endParaRPr>
+              <a:solidFill>
+                <a:schemeClr val="dk2"/>
+              </a:solidFill>
+            </a:endParaRPr>
+          </a:p>
+          <a:p>
+            <a:pPr indent="0" lvl="0" marL="0" rtl="0" algn="l">
+              <a:lnSpc>
+                <a:spcPct val="115000"/>
+              </a:lnSpc>
+              <a:spcBef>
+                <a:spcPts val="1200"/>
+              </a:spcBef>
+              <a:spcAft>
+                <a:spcPts val="0"/>
+              </a:spcAft>
+              <a:buNone/>
+            </a:pPr>
+            <a:r>
               <a:t/>
             </a:r>
-            <a:endParaRPr sz="1900">
+            <a:endParaRPr>
+              <a:solidFill>
+                <a:schemeClr val="dk2"/>
+              </a:solidFill>
+            </a:endParaRPr>
+          </a:p>
+          <a:p>
+            <a:pPr indent="0" lvl="0" marL="0" rtl="0" algn="l">
+              <a:spcBef>
+                <a:spcPts val="1200"/>
+              </a:spcBef>
+              <a:spcAft>
+                <a:spcPts val="0"/>
+              </a:spcAft>
+              <a:buNone/>
+            </a:pPr>
+            <a:r>
+              <a:t/>
+            </a:r>
+            <a:endParaRPr sz="1700">
               <a:solidFill>
                 <a:schemeClr val="dk2"/>
               </a:solidFill>
@@ -31057,27 +31334,19 @@
           <a:lstStyle/>
           <a:p>
             <a:pPr indent="0" lvl="0" marL="0" rtl="0" algn="l">
-              <a:lnSpc>
-                <a:spcPct val="115000"/>
-              </a:lnSpc>
-              <a:spcBef>
-                <a:spcPts val="1800"/>
-              </a:spcBef>
-              <a:spcAft>
-                <a:spcPts val="400"/>
-              </a:spcAft>
-              <a:buClr>
-                <a:schemeClr val="dk1"/>
-              </a:buClr>
-              <a:buSzPts val="1100"/>
-              <a:buFont typeface="Arial"/>
+              <a:spcBef>
+                <a:spcPts val="0"/>
+              </a:spcBef>
+              <a:spcAft>
+                <a:spcPts val="0"/>
+              </a:spcAft>
               <a:buNone/>
             </a:pPr>
             <a:r>
-              <a:rPr b="1" lang="en-GB" sz="3100"/>
-              <a:t>9. Project Impact</a:t>
-            </a:r>
-            <a:endParaRPr b="1" sz="3100"/>
+              <a:rPr lang="en-GB"/>
+              <a:t>8.Predictive Recommendations</a:t>
+            </a:r>
+            <a:endParaRPr/>
           </a:p>
         </p:txBody>
       </p:sp>
@@ -31105,36 +31374,41 @@
           <a:lstStyle/>
           <a:p>
             <a:pPr indent="0" lvl="0" marL="0" rtl="0" algn="l">
-              <a:spcBef>
-                <a:spcPts val="0"/>
-              </a:spcBef>
-              <a:spcAft>
-                <a:spcPts val="0"/>
-              </a:spcAft>
-              <a:buClr>
-                <a:schemeClr val="dk1"/>
-              </a:buClr>
-              <a:buSzPts val="1100"/>
-              <a:buFont typeface="Arial"/>
+              <a:lnSpc>
+                <a:spcPct val="115000"/>
+              </a:lnSpc>
+              <a:spcBef>
+                <a:spcPts val="1200"/>
+              </a:spcBef>
+              <a:spcAft>
+                <a:spcPts val="0"/>
+              </a:spcAft>
               <a:buNone/>
             </a:pPr>
             <a:r>
-              <a:rPr b="1" lang="en-GB" sz="2200">
+              <a:rPr b="1" lang="en-GB" sz="1500">
                 <a:solidFill>
                   <a:schemeClr val="dk2"/>
                 </a:solidFill>
               </a:rPr>
-              <a:t>Improved Maintenance Efficiency</a:t>
-            </a:r>
-            <a:r>
-              <a:rPr lang="en-GB" sz="2200">
+              <a:t>5. Improve Seasonal and Insufficient Water Supply:</a:t>
+            </a:r>
+            <a:br>
+              <a:rPr b="1" lang="en-GB" sz="1500">
                 <a:solidFill>
                   <a:schemeClr val="dk2"/>
                 </a:solidFill>
               </a:rPr>
-              <a:t>: Enables timely repairs and consistent water supply.</a:t>
-            </a:r>
-            <a:endParaRPr sz="2200">
+            </a:br>
+            <a:r>
+              <a:rPr lang="en-GB" sz="1500">
+                <a:solidFill>
+                  <a:schemeClr val="dk2"/>
+                </a:solidFill>
+              </a:rPr>
+              <a:t>Enhance maintenance practices for pumps with seasonal or insufficient water supply to ensure consistent water availability.</a:t>
+            </a:r>
+            <a:endParaRPr sz="1500">
               <a:solidFill>
                 <a:schemeClr val="dk2"/>
               </a:solidFill>
@@ -31142,36 +31416,41 @@
           </a:p>
           <a:p>
             <a:pPr indent="0" lvl="0" marL="0" rtl="0" algn="l">
-              <a:spcBef>
-                <a:spcPts val="0"/>
-              </a:spcBef>
-              <a:spcAft>
-                <a:spcPts val="0"/>
-              </a:spcAft>
-              <a:buClr>
-                <a:schemeClr val="dk1"/>
-              </a:buClr>
-              <a:buSzPts val="1100"/>
-              <a:buFont typeface="Arial"/>
+              <a:lnSpc>
+                <a:spcPct val="115000"/>
+              </a:lnSpc>
+              <a:spcBef>
+                <a:spcPts val="1200"/>
+              </a:spcBef>
+              <a:spcAft>
+                <a:spcPts val="0"/>
+              </a:spcAft>
               <a:buNone/>
             </a:pPr>
             <a:r>
-              <a:rPr b="1" lang="en-GB" sz="2200">
+              <a:rPr b="1" lang="en-GB" sz="1500">
                 <a:solidFill>
                   <a:schemeClr val="dk2"/>
                 </a:solidFill>
               </a:rPr>
-              <a:t>Cost-Effective Resource Allocation</a:t>
-            </a:r>
-            <a:r>
-              <a:rPr lang="en-GB" sz="2200">
+              <a:t>6. Train Communities for Handpump Maintenance:</a:t>
+            </a:r>
+            <a:br>
+              <a:rPr b="1" lang="en-GB" sz="1500">
                 <a:solidFill>
                   <a:schemeClr val="dk2"/>
                 </a:solidFill>
               </a:rPr>
-              <a:t>: Optimizes budget use and reduces unnecessary expenses.</a:t>
-            </a:r>
-            <a:endParaRPr sz="2200">
+            </a:br>
+            <a:r>
+              <a:rPr lang="en-GB" sz="1500">
+                <a:solidFill>
+                  <a:schemeClr val="dk2"/>
+                </a:solidFill>
+              </a:rPr>
+              <a:t>Provide training for communities to effectively maintain handpumps, reducing failure rates.</a:t>
+            </a:r>
+            <a:endParaRPr sz="1500">
               <a:solidFill>
                 <a:schemeClr val="dk2"/>
               </a:solidFill>
@@ -31179,36 +31458,41 @@
           </a:p>
           <a:p>
             <a:pPr indent="0" lvl="0" marL="0" rtl="0" algn="l">
-              <a:spcBef>
-                <a:spcPts val="0"/>
-              </a:spcBef>
-              <a:spcAft>
-                <a:spcPts val="0"/>
-              </a:spcAft>
-              <a:buClr>
-                <a:schemeClr val="dk1"/>
-              </a:buClr>
-              <a:buSzPts val="1100"/>
-              <a:buFont typeface="Arial"/>
+              <a:lnSpc>
+                <a:spcPct val="115000"/>
+              </a:lnSpc>
+              <a:spcBef>
+                <a:spcPts val="1200"/>
+              </a:spcBef>
+              <a:spcAft>
+                <a:spcPts val="0"/>
+              </a:spcAft>
               <a:buNone/>
             </a:pPr>
             <a:r>
-              <a:rPr b="1" lang="en-GB" sz="2200">
+              <a:rPr b="1" lang="en-GB" sz="1500">
                 <a:solidFill>
                   <a:schemeClr val="dk2"/>
                 </a:solidFill>
               </a:rPr>
-              <a:t>Scalability and Adaptability</a:t>
-            </a:r>
-            <a:r>
-              <a:rPr lang="en-GB" sz="2200">
+              <a:t>7. Promote Regular Payment for Water Services:</a:t>
+            </a:r>
+            <a:br>
+              <a:rPr b="1" lang="en-GB" sz="1500">
                 <a:solidFill>
                   <a:schemeClr val="dk2"/>
                 </a:solidFill>
               </a:rPr>
-              <a:t>: Easily adapts to include more features or updated data.</a:t>
-            </a:r>
-            <a:endParaRPr sz="2200">
+            </a:br>
+            <a:r>
+              <a:rPr lang="en-GB" sz="1500">
+                <a:solidFill>
+                  <a:schemeClr val="dk2"/>
+                </a:solidFill>
+              </a:rPr>
+              <a:t>Encourage consistent payment for water services to support sustainable maintenance funding.</a:t>
+            </a:r>
+            <a:endParaRPr sz="1500">
               <a:solidFill>
                 <a:schemeClr val="dk2"/>
               </a:solidFill>
@@ -31216,18 +31500,41 @@
           </a:p>
           <a:p>
             <a:pPr indent="0" lvl="0" marL="0" rtl="0" algn="l">
-              <a:spcBef>
-                <a:spcPts val="0"/>
-              </a:spcBef>
-              <a:spcAft>
-                <a:spcPts val="0"/>
+              <a:lnSpc>
+                <a:spcPct val="115000"/>
+              </a:lnSpc>
+              <a:spcBef>
+                <a:spcPts val="1200"/>
+              </a:spcBef>
+              <a:spcAft>
+                <a:spcPts val="1200"/>
               </a:spcAft>
               <a:buNone/>
             </a:pPr>
             <a:r>
-              <a:t/>
-            </a:r>
-            <a:endParaRPr b="1" sz="2800">
+              <a:rPr b="1" lang="en-GB" sz="1500">
+                <a:solidFill>
+                  <a:schemeClr val="dk2"/>
+                </a:solidFill>
+              </a:rPr>
+              <a:t>8. Allocate Resources Based on Population:</a:t>
+            </a:r>
+            <a:br>
+              <a:rPr b="1" lang="en-GB" sz="1500">
+                <a:solidFill>
+                  <a:schemeClr val="dk2"/>
+                </a:solidFill>
+              </a:rPr>
+            </a:br>
+            <a:r>
+              <a:rPr lang="en-GB" sz="1500">
+                <a:solidFill>
+                  <a:schemeClr val="dk2"/>
+                </a:solidFill>
+              </a:rPr>
+              <a:t>Prioritize maintenance resources for areas with higher populations to manage increased wear and tear.</a:t>
+            </a:r>
+            <a:endParaRPr sz="1800">
               <a:solidFill>
                 <a:schemeClr val="dk2"/>
               </a:solidFill>
@@ -31294,7 +31601,7 @@
             </a:pPr>
             <a:r>
               <a:rPr lang="en-GB"/>
-              <a:t>10. Conclusion</a:t>
+              <a:t>8.Predictive Recommendations</a:t>
             </a:r>
             <a:endParaRPr/>
           </a:p>
@@ -31338,29 +31645,29 @@
               <a:buNone/>
             </a:pPr>
             <a:r>
-              <a:rPr b="1" lang="en-GB" sz="1200">
+              <a:rPr b="1" lang="en-GB" sz="1600">
                 <a:solidFill>
                   <a:schemeClr val="dk2"/>
                 </a:solidFill>
               </a:rPr>
-              <a:t>Project Success</a:t>
-            </a:r>
-            <a:r>
-              <a:rPr lang="en-GB" sz="1200">
+              <a:t>Model Utility</a:t>
+            </a:r>
+            <a:r>
+              <a:rPr lang="en-GB" sz="1600">
                 <a:solidFill>
                   <a:schemeClr val="dk2"/>
                 </a:solidFill>
               </a:rPr>
               <a:t>:</a:t>
             </a:r>
-            <a:endParaRPr sz="1200">
+            <a:endParaRPr sz="1600">
               <a:solidFill>
                 <a:schemeClr val="dk2"/>
               </a:solidFill>
             </a:endParaRPr>
           </a:p>
           <a:p>
-            <a:pPr indent="-304800" lvl="0" marL="457200" rtl="0" algn="l">
+            <a:pPr indent="-330200" lvl="0" marL="457200" rtl="0" algn="l">
               <a:spcBef>
                 <a:spcPts val="1200"/>
               </a:spcBef>
@@ -31370,25 +31677,33 @@
               <a:buClr>
                 <a:schemeClr val="dk2"/>
               </a:buClr>
-              <a:buSzPts val="1200"/>
+              <a:buSzPts val="1600"/>
               <a:buChar char="●"/>
             </a:pPr>
             <a:r>
-              <a:rPr lang="en-GB" sz="1200">
+              <a:rPr b="1" lang="en-GB" sz="1600">
                 <a:solidFill>
                   <a:schemeClr val="dk2"/>
                 </a:solidFill>
               </a:rPr>
-              <a:t>Developed a robust predictive model that categorizes water pumps as functional, needing repair, or non-functional using data from Taarifa and the Tanzanian Ministry of Water.</a:t>
-            </a:r>
-            <a:endParaRPr sz="1200">
+              <a:t>Most Useful</a:t>
+            </a:r>
+            <a:r>
+              <a:rPr lang="en-GB" sz="1600">
+                <a:solidFill>
+                  <a:schemeClr val="dk2"/>
+                </a:solidFill>
+              </a:rPr>
+              <a:t>: In rural or remote areas where quick maintenance decisions are crucial. Helps prioritize repairs and maintenance.</a:t>
+            </a:r>
+            <a:endParaRPr sz="1600">
               <a:solidFill>
                 <a:schemeClr val="dk2"/>
               </a:solidFill>
             </a:endParaRPr>
           </a:p>
           <a:p>
-            <a:pPr indent="-304800" lvl="0" marL="457200" rtl="0" algn="l">
+            <a:pPr indent="-330200" lvl="0" marL="457200" rtl="0" algn="l">
               <a:spcBef>
                 <a:spcPts val="1200"/>
               </a:spcBef>
@@ -31398,18 +31713,26 @@
               <a:buClr>
                 <a:schemeClr val="dk2"/>
               </a:buClr>
-              <a:buSzPts val="1200"/>
+              <a:buSzPts val="1600"/>
               <a:buChar char="●"/>
             </a:pPr>
             <a:r>
-              <a:rPr lang="en-GB" sz="1200">
+              <a:rPr b="1" lang="en-GB" sz="1600">
                 <a:solidFill>
                   <a:schemeClr val="dk2"/>
                 </a:solidFill>
               </a:rPr>
-              <a:t>Directly addresses the need for efficient water pump maintenance in Tanzania.</a:t>
-            </a:r>
-            <a:endParaRPr sz="1200">
+              <a:t>Less Effective</a:t>
+            </a:r>
+            <a:r>
+              <a:rPr lang="en-GB" sz="1600">
+                <a:solidFill>
+                  <a:schemeClr val="dk2"/>
+                </a:solidFill>
+              </a:rPr>
+              <a:t>: In rapidly changing conditions or where historical data is outdated.</a:t>
+            </a:r>
+            <a:endParaRPr sz="1600">
               <a:solidFill>
                 <a:schemeClr val="dk2"/>
               </a:solidFill>
@@ -31431,29 +31754,29 @@
               <a:buNone/>
             </a:pPr>
             <a:r>
-              <a:rPr b="1" lang="en-GB" sz="1200">
+              <a:rPr b="1" lang="en-GB" sz="1600">
                 <a:solidFill>
                   <a:schemeClr val="dk2"/>
                 </a:solidFill>
               </a:rPr>
-              <a:t>Model Advantages</a:t>
-            </a:r>
-            <a:r>
-              <a:rPr lang="en-GB" sz="1200">
+              <a:t>Suggestions for Improvement</a:t>
+            </a:r>
+            <a:r>
+              <a:rPr lang="en-GB" sz="1600">
                 <a:solidFill>
                   <a:schemeClr val="dk2"/>
                 </a:solidFill>
               </a:rPr>
               <a:t>:</a:t>
             </a:r>
-            <a:endParaRPr sz="1200">
+            <a:endParaRPr sz="1600">
               <a:solidFill>
                 <a:schemeClr val="dk2"/>
               </a:solidFill>
             </a:endParaRPr>
           </a:p>
           <a:p>
-            <a:pPr indent="-304800" lvl="0" marL="457200" rtl="0" algn="l">
+            <a:pPr indent="-330200" lvl="0" marL="457200" rtl="0" algn="l">
               <a:spcBef>
                 <a:spcPts val="1200"/>
               </a:spcBef>
@@ -31463,33 +31786,33 @@
               <a:buClr>
                 <a:schemeClr val="dk2"/>
               </a:buClr>
-              <a:buSzPts val="1200"/>
+              <a:buSzPts val="1600"/>
               <a:buChar char="●"/>
             </a:pPr>
             <a:r>
-              <a:rPr b="1" lang="en-GB" sz="1200">
+              <a:rPr b="1" lang="en-GB" sz="1600">
                 <a:solidFill>
                   <a:schemeClr val="dk2"/>
                 </a:solidFill>
               </a:rPr>
-              <a:t>Accuracy</a:t>
-            </a:r>
-            <a:r>
-              <a:rPr lang="en-GB" sz="1200">
+              <a:t>Data Accuracy</a:t>
+            </a:r>
+            <a:r>
+              <a:rPr lang="en-GB" sz="1600">
                 <a:solidFill>
                   <a:schemeClr val="dk2"/>
                 </a:solidFill>
               </a:rPr>
-              <a:t>: The Decision Tree Classifier delivers reliable predictions, essential for timely maintenance decisions.</a:t>
-            </a:r>
-            <a:endParaRPr sz="1200">
+              <a:t>: Ensure accurate and up-to-date data on pump conditions and maintenance.</a:t>
+            </a:r>
+            <a:endParaRPr sz="1600">
               <a:solidFill>
                 <a:schemeClr val="dk2"/>
               </a:solidFill>
             </a:endParaRPr>
           </a:p>
           <a:p>
-            <a:pPr indent="-304800" lvl="0" marL="457200" rtl="0" algn="l">
+            <a:pPr indent="-330200" lvl="0" marL="457200" rtl="0" algn="l">
               <a:spcBef>
                 <a:spcPts val="1200"/>
               </a:spcBef>
@@ -31499,98 +31822,26 @@
               <a:buClr>
                 <a:schemeClr val="dk2"/>
               </a:buClr>
-              <a:buSzPts val="1200"/>
+              <a:buSzPts val="1600"/>
               <a:buChar char="●"/>
             </a:pPr>
             <a:r>
-              <a:rPr b="1" lang="en-GB" sz="1200">
+              <a:rPr b="1" lang="en-GB" sz="1600">
                 <a:solidFill>
                   <a:schemeClr val="dk2"/>
                 </a:solidFill>
               </a:rPr>
-              <a:t>Efficiency</a:t>
-            </a:r>
-            <a:r>
-              <a:rPr lang="en-GB" sz="1200">
+              <a:t>Feature Engineering</a:t>
+            </a:r>
+            <a:r>
+              <a:rPr lang="en-GB" sz="1600">
                 <a:solidFill>
                   <a:schemeClr val="dk2"/>
                 </a:solidFill>
               </a:rPr>
-              <a:t>: Enhances maintenance scheduling and reduces downtime, ensuring consistent water supply.</a:t>
-            </a:r>
-            <a:endParaRPr sz="1200">
-              <a:solidFill>
-                <a:schemeClr val="dk2"/>
-              </a:solidFill>
-            </a:endParaRPr>
-          </a:p>
-          <a:p>
-            <a:pPr indent="-304800" lvl="0" marL="457200" rtl="0" algn="l">
-              <a:spcBef>
-                <a:spcPts val="1200"/>
-              </a:spcBef>
-              <a:spcAft>
-                <a:spcPts val="0"/>
-              </a:spcAft>
-              <a:buClr>
-                <a:schemeClr val="dk2"/>
-              </a:buClr>
-              <a:buSzPts val="1200"/>
-              <a:buChar char="●"/>
-            </a:pPr>
-            <a:r>
-              <a:rPr b="1" lang="en-GB" sz="1200">
-                <a:solidFill>
-                  <a:schemeClr val="dk2"/>
-                </a:solidFill>
-              </a:rPr>
-              <a:t>Cost-Effectiveness</a:t>
-            </a:r>
-            <a:r>
-              <a:rPr lang="en-GB" sz="1200">
-                <a:solidFill>
-                  <a:schemeClr val="dk2"/>
-                </a:solidFill>
-              </a:rPr>
-              <a:t>: Optimizes resource allocation and minimizes expenses by identifying priority pumps for repair.</a:t>
-            </a:r>
-            <a:endParaRPr sz="1200">
-              <a:solidFill>
-                <a:schemeClr val="dk2"/>
-              </a:solidFill>
-            </a:endParaRPr>
-          </a:p>
-          <a:p>
-            <a:pPr indent="-304800" lvl="0" marL="457200" rtl="0" algn="l">
-              <a:spcBef>
-                <a:spcPts val="1200"/>
-              </a:spcBef>
-              <a:spcAft>
-                <a:spcPts val="0"/>
-              </a:spcAft>
-              <a:buClr>
-                <a:schemeClr val="dk2"/>
-              </a:buClr>
-              <a:buSzPts val="1200"/>
-              <a:buChar char="●"/>
-            </a:pPr>
-            <a:r>
-              <a:rPr b="1" lang="en-GB" sz="1200">
-                <a:solidFill>
-                  <a:schemeClr val="dk2"/>
-                </a:solidFill>
-              </a:rPr>
-              <a:t>Scalability</a:t>
-            </a:r>
-            <a:r>
-              <a:rPr lang="en-GB" sz="1200">
-                <a:solidFill>
-                  <a:schemeClr val="dk2"/>
-                </a:solidFill>
-              </a:rPr>
-              <a:t>: Easily adaptable to incorporate new data or features, supporting ongoing infrastructure management.</a:t>
-            </a:r>
-            <a:endParaRPr sz="1200">
+              <a:t>: Add features related to usage patterns, maintenance history, and environmental conditions.</a:t>
+            </a:r>
+            <a:endParaRPr sz="1600">
               <a:solidFill>
                 <a:schemeClr val="dk2"/>
               </a:solidFill>
@@ -31604,6 +31855,77 @@
               <a:spcAft>
                 <a:spcPts val="0"/>
               </a:spcAft>
+              <a:buNone/>
+            </a:pPr>
+            <a:r>
+              <a:t/>
+            </a:r>
+            <a:endParaRPr sz="1900">
+              <a:solidFill>
+                <a:schemeClr val="dk2"/>
+              </a:solidFill>
+            </a:endParaRPr>
+          </a:p>
+        </p:txBody>
+      </p:sp>
+    </p:spTree>
+  </p:cSld>
+  <p:clrMapOvr>
+    <a:masterClrMapping/>
+  </p:clrMapOvr>
+</p:sld>
+</file>
+
+<file path=ppt/slides/slide18.xml><?xml version="1.0" encoding="utf-8"?>
+<p:sld xmlns:a="http://schemas.openxmlformats.org/drawingml/2006/main" xmlns:r="http://schemas.openxmlformats.org/officeDocument/2006/relationships" xmlns:mc="http://schemas.openxmlformats.org/markup-compatibility/2006" xmlns:mv="urn:schemas-microsoft-com:mac:vml" xmlns:p="http://schemas.openxmlformats.org/presentationml/2006/main" xmlns:c="http://schemas.openxmlformats.org/drawingml/2006/chart" xmlns:dgm="http://schemas.openxmlformats.org/drawingml/2006/diagram" xmlns:o="urn:schemas-microsoft-com:office:office" xmlns:v="urn:schemas-microsoft-com:vml" xmlns:pvml="urn:schemas-microsoft-com:office:powerpoint" xmlns:com="http://schemas.openxmlformats.org/drawingml/2006/compatibility" xmlns:p14="http://schemas.microsoft.com/office/powerpoint/2010/main" xmlns:p15="http://schemas.microsoft.com/office/powerpoint/2012/main" xmlns:ahyp="http://schemas.microsoft.com/office/drawing/2018/hyperlinkcolor">
+  <p:cSld>
+    <p:spTree>
+      <p:nvGrpSpPr>
+        <p:cNvPr id="356" name="Shape 356"/>
+        <p:cNvGrpSpPr/>
+        <p:nvPr/>
+      </p:nvGrpSpPr>
+      <p:grpSpPr>
+        <a:xfrm>
+          <a:off x="0" y="0"/>
+          <a:ext cx="0" cy="0"/>
+          <a:chOff x="0" y="0"/>
+          <a:chExt cx="0" cy="0"/>
+        </a:xfrm>
+      </p:grpSpPr>
+      <p:sp>
+        <p:nvSpPr>
+          <p:cNvPr id="357" name="Google Shape;357;p48"/>
+          <p:cNvSpPr txBox="1"/>
+          <p:nvPr>
+            <p:ph type="title"/>
+          </p:nvPr>
+        </p:nvSpPr>
+        <p:spPr>
+          <a:xfrm>
+            <a:off x="720000" y="445025"/>
+            <a:ext cx="7704000" cy="572700"/>
+          </a:xfrm>
+          <a:prstGeom prst="rect">
+            <a:avLst/>
+          </a:prstGeom>
+        </p:spPr>
+        <p:txBody>
+          <a:bodyPr anchorCtr="0" anchor="ctr" bIns="91425" lIns="91425" spcFirstLastPara="1" rIns="91425" wrap="square" tIns="91425">
+            <a:noAutofit/>
+          </a:bodyPr>
+          <a:lstStyle/>
+          <a:p>
+            <a:pPr indent="0" lvl="0" marL="0" rtl="0" algn="l">
+              <a:lnSpc>
+                <a:spcPct val="115000"/>
+              </a:lnSpc>
+              <a:spcBef>
+                <a:spcPts val="1800"/>
+              </a:spcBef>
+              <a:spcAft>
+                <a:spcPts val="400"/>
+              </a:spcAft>
               <a:buClr>
                 <a:schemeClr val="dk1"/>
               </a:buClr>
@@ -31612,94 +31934,67 @@
               <a:buNone/>
             </a:pPr>
             <a:r>
-              <a:rPr b="1" lang="en-GB" sz="1200">
+              <a:rPr b="1" lang="en-GB" sz="3100"/>
+              <a:t>9. Project Impact</a:t>
+            </a:r>
+            <a:endParaRPr b="1" sz="3100"/>
+          </a:p>
+        </p:txBody>
+      </p:sp>
+      <p:sp>
+        <p:nvSpPr>
+          <p:cNvPr id="358" name="Google Shape;358;p48"/>
+          <p:cNvSpPr txBox="1"/>
+          <p:nvPr>
+            <p:ph idx="1" type="body"/>
+          </p:nvPr>
+        </p:nvSpPr>
+        <p:spPr>
+          <a:xfrm>
+            <a:off x="720000" y="1152475"/>
+            <a:ext cx="7704000" cy="572700"/>
+          </a:xfrm>
+          <a:prstGeom prst="rect">
+            <a:avLst/>
+          </a:prstGeom>
+        </p:spPr>
+        <p:txBody>
+          <a:bodyPr anchorCtr="0" anchor="t" bIns="91425" lIns="91425" spcFirstLastPara="1" rIns="91425" wrap="square" tIns="91425">
+            <a:noAutofit/>
+          </a:bodyPr>
+          <a:lstStyle/>
+          <a:p>
+            <a:pPr indent="0" lvl="0" marL="0" rtl="0" algn="l">
+              <a:spcBef>
+                <a:spcPts val="0"/>
+              </a:spcBef>
+              <a:spcAft>
+                <a:spcPts val="0"/>
+              </a:spcAft>
+              <a:buClr>
+                <a:schemeClr val="dk1"/>
+              </a:buClr>
+              <a:buSzPts val="1100"/>
+              <a:buFont typeface="Arial"/>
+              <a:buNone/>
+            </a:pPr>
+            <a:r>
+              <a:rPr b="1" lang="en-GB" sz="2200">
                 <a:solidFill>
                   <a:schemeClr val="dk2"/>
                 </a:solidFill>
               </a:rPr>
-              <a:t>Stakeholder Value</a:t>
-            </a:r>
-            <a:r>
-              <a:rPr lang="en-GB" sz="1200">
+              <a:t>Improved Maintenance Efficiency</a:t>
+            </a:r>
+            <a:r>
+              <a:rPr lang="en-GB" sz="2200">
                 <a:solidFill>
                   <a:schemeClr val="dk2"/>
                 </a:solidFill>
               </a:rPr>
-              <a:t>:</a:t>
-            </a:r>
-            <a:endParaRPr sz="1200">
-              <a:solidFill>
-                <a:schemeClr val="dk2"/>
-              </a:solidFill>
-            </a:endParaRPr>
-          </a:p>
-          <a:p>
-            <a:pPr indent="-304800" lvl="0" marL="457200" rtl="0" algn="l">
-              <a:spcBef>
-                <a:spcPts val="1200"/>
-              </a:spcBef>
-              <a:spcAft>
-                <a:spcPts val="0"/>
-              </a:spcAft>
-              <a:buClr>
-                <a:schemeClr val="dk2"/>
-              </a:buClr>
-              <a:buSzPts val="1200"/>
-              <a:buChar char="●"/>
-            </a:pPr>
-            <a:r>
-              <a:rPr b="1" lang="en-GB" sz="1200">
-                <a:solidFill>
-                  <a:schemeClr val="dk2"/>
-                </a:solidFill>
-              </a:rPr>
-              <a:t>For the Government</a:t>
-            </a:r>
-            <a:r>
-              <a:rPr lang="en-GB" sz="1200">
-                <a:solidFill>
-                  <a:schemeClr val="dk2"/>
-                </a:solidFill>
-              </a:rPr>
-              <a:t>: A critical tool for optimizing water infrastructure management and aligning with national goals for improved water access.</a:t>
-            </a:r>
-            <a:endParaRPr sz="1200">
-              <a:solidFill>
-                <a:schemeClr val="dk2"/>
-              </a:solidFill>
-            </a:endParaRPr>
-          </a:p>
-          <a:p>
-            <a:pPr indent="-304800" lvl="0" marL="457200" rtl="0" algn="l">
-              <a:spcBef>
-                <a:spcPts val="1200"/>
-              </a:spcBef>
-              <a:spcAft>
-                <a:spcPts val="0"/>
-              </a:spcAft>
-              <a:buClr>
-                <a:schemeClr val="dk2"/>
-              </a:buClr>
-              <a:buSzPts val="1200"/>
-              <a:buChar char="●"/>
-            </a:pPr>
-            <a:r>
-              <a:rPr b="1" lang="en-GB" sz="1200">
-                <a:solidFill>
-                  <a:schemeClr val="dk2"/>
-                </a:solidFill>
-              </a:rPr>
-              <a:t>For Citizens</a:t>
-            </a:r>
-            <a:r>
-              <a:rPr lang="en-GB" sz="1200">
-                <a:solidFill>
-                  <a:schemeClr val="dk2"/>
-                </a:solidFill>
-              </a:rPr>
-              <a:t>: Ensures reliable access to clean water, contributing to enhanced community well-being.</a:t>
-            </a:r>
-            <a:endParaRPr sz="1200">
+              <a:t>: Enables timely repairs and consistent water supply.</a:t>
+            </a:r>
+            <a:endParaRPr sz="2200">
               <a:solidFill>
                 <a:schemeClr val="dk2"/>
               </a:solidFill>
@@ -31713,12 +32008,440 @@
               <a:spcAft>
                 <a:spcPts val="0"/>
               </a:spcAft>
+              <a:buClr>
+                <a:schemeClr val="dk1"/>
+              </a:buClr>
+              <a:buSzPts val="1100"/>
+              <a:buFont typeface="Arial"/>
               <a:buNone/>
             </a:pPr>
             <a:r>
+              <a:rPr b="1" lang="en-GB" sz="2200">
+                <a:solidFill>
+                  <a:schemeClr val="dk2"/>
+                </a:solidFill>
+              </a:rPr>
+              <a:t>Cost-Effective Resource Allocation</a:t>
+            </a:r>
+            <a:r>
+              <a:rPr lang="en-GB" sz="2200">
+                <a:solidFill>
+                  <a:schemeClr val="dk2"/>
+                </a:solidFill>
+              </a:rPr>
+              <a:t>: Optimizes budget use and reduces unnecessary expenses.</a:t>
+            </a:r>
+            <a:endParaRPr sz="2200">
+              <a:solidFill>
+                <a:schemeClr val="dk2"/>
+              </a:solidFill>
+            </a:endParaRPr>
+          </a:p>
+          <a:p>
+            <a:pPr indent="0" lvl="0" marL="0" rtl="0" algn="l">
+              <a:spcBef>
+                <a:spcPts val="0"/>
+              </a:spcBef>
+              <a:spcAft>
+                <a:spcPts val="0"/>
+              </a:spcAft>
+              <a:buClr>
+                <a:schemeClr val="dk1"/>
+              </a:buClr>
+              <a:buSzPts val="1100"/>
+              <a:buFont typeface="Arial"/>
+              <a:buNone/>
+            </a:pPr>
+            <a:r>
+              <a:rPr b="1" lang="en-GB" sz="2200">
+                <a:solidFill>
+                  <a:schemeClr val="dk2"/>
+                </a:solidFill>
+              </a:rPr>
+              <a:t>Scalability and Adaptability</a:t>
+            </a:r>
+            <a:r>
+              <a:rPr lang="en-GB" sz="2200">
+                <a:solidFill>
+                  <a:schemeClr val="dk2"/>
+                </a:solidFill>
+              </a:rPr>
+              <a:t>: Easily adapts to include more features or updated data.</a:t>
+            </a:r>
+            <a:endParaRPr sz="2200">
+              <a:solidFill>
+                <a:schemeClr val="dk2"/>
+              </a:solidFill>
+            </a:endParaRPr>
+          </a:p>
+          <a:p>
+            <a:pPr indent="0" lvl="0" marL="0" rtl="0" algn="l">
+              <a:spcBef>
+                <a:spcPts val="0"/>
+              </a:spcBef>
+              <a:spcAft>
+                <a:spcPts val="0"/>
+              </a:spcAft>
+              <a:buNone/>
+            </a:pPr>
+            <a:r>
               <a:t/>
             </a:r>
-            <a:endParaRPr b="1" sz="1200">
+            <a:endParaRPr b="1" sz="2800">
+              <a:solidFill>
+                <a:schemeClr val="dk2"/>
+              </a:solidFill>
+            </a:endParaRPr>
+          </a:p>
+        </p:txBody>
+      </p:sp>
+    </p:spTree>
+  </p:cSld>
+  <p:clrMapOvr>
+    <a:masterClrMapping/>
+  </p:clrMapOvr>
+</p:sld>
+</file>
+
+<file path=ppt/slides/slide19.xml><?xml version="1.0" encoding="utf-8"?>
+<p:sld xmlns:a="http://schemas.openxmlformats.org/drawingml/2006/main" xmlns:r="http://schemas.openxmlformats.org/officeDocument/2006/relationships" xmlns:mc="http://schemas.openxmlformats.org/markup-compatibility/2006" xmlns:mv="urn:schemas-microsoft-com:mac:vml" xmlns:p="http://schemas.openxmlformats.org/presentationml/2006/main" xmlns:c="http://schemas.openxmlformats.org/drawingml/2006/chart" xmlns:dgm="http://schemas.openxmlformats.org/drawingml/2006/diagram" xmlns:o="urn:schemas-microsoft-com:office:office" xmlns:v="urn:schemas-microsoft-com:vml" xmlns:pvml="urn:schemas-microsoft-com:office:powerpoint" xmlns:com="http://schemas.openxmlformats.org/drawingml/2006/compatibility" xmlns:p14="http://schemas.microsoft.com/office/powerpoint/2010/main" xmlns:p15="http://schemas.microsoft.com/office/powerpoint/2012/main" xmlns:ahyp="http://schemas.microsoft.com/office/drawing/2018/hyperlinkcolor">
+  <p:cSld>
+    <p:spTree>
+      <p:nvGrpSpPr>
+        <p:cNvPr id="362" name="Shape 362"/>
+        <p:cNvGrpSpPr/>
+        <p:nvPr/>
+      </p:nvGrpSpPr>
+      <p:grpSpPr>
+        <a:xfrm>
+          <a:off x="0" y="0"/>
+          <a:ext cx="0" cy="0"/>
+          <a:chOff x="0" y="0"/>
+          <a:chExt cx="0" cy="0"/>
+        </a:xfrm>
+      </p:grpSpPr>
+      <p:sp>
+        <p:nvSpPr>
+          <p:cNvPr id="363" name="Google Shape;363;p49"/>
+          <p:cNvSpPr txBox="1"/>
+          <p:nvPr>
+            <p:ph type="title"/>
+          </p:nvPr>
+        </p:nvSpPr>
+        <p:spPr>
+          <a:xfrm>
+            <a:off x="720000" y="445025"/>
+            <a:ext cx="7704000" cy="572700"/>
+          </a:xfrm>
+          <a:prstGeom prst="rect">
+            <a:avLst/>
+          </a:prstGeom>
+        </p:spPr>
+        <p:txBody>
+          <a:bodyPr anchorCtr="0" anchor="ctr" bIns="91425" lIns="91425" spcFirstLastPara="1" rIns="91425" wrap="square" tIns="91425">
+            <a:noAutofit/>
+          </a:bodyPr>
+          <a:lstStyle/>
+          <a:p>
+            <a:pPr indent="0" lvl="0" marL="0" rtl="0" algn="l">
+              <a:spcBef>
+                <a:spcPts val="0"/>
+              </a:spcBef>
+              <a:spcAft>
+                <a:spcPts val="0"/>
+              </a:spcAft>
+              <a:buNone/>
+            </a:pPr>
+            <a:r>
+              <a:rPr lang="en-GB"/>
+              <a:t>10. Conclusion</a:t>
+            </a:r>
+            <a:endParaRPr/>
+          </a:p>
+        </p:txBody>
+      </p:sp>
+      <p:sp>
+        <p:nvSpPr>
+          <p:cNvPr id="364" name="Google Shape;364;p49"/>
+          <p:cNvSpPr txBox="1"/>
+          <p:nvPr>
+            <p:ph idx="1" type="body"/>
+          </p:nvPr>
+        </p:nvSpPr>
+        <p:spPr>
+          <a:xfrm>
+            <a:off x="720000" y="1152475"/>
+            <a:ext cx="7704000" cy="572700"/>
+          </a:xfrm>
+          <a:prstGeom prst="rect">
+            <a:avLst/>
+          </a:prstGeom>
+        </p:spPr>
+        <p:txBody>
+          <a:bodyPr anchorCtr="0" anchor="t" bIns="91425" lIns="91425" spcFirstLastPara="1" rIns="91425" wrap="square" tIns="91425">
+            <a:noAutofit/>
+          </a:bodyPr>
+          <a:lstStyle/>
+          <a:p>
+            <a:pPr indent="0" lvl="0" marL="0" rtl="0" algn="l">
+              <a:spcBef>
+                <a:spcPts val="0"/>
+              </a:spcBef>
+              <a:spcAft>
+                <a:spcPts val="0"/>
+              </a:spcAft>
+              <a:buClr>
+                <a:schemeClr val="dk1"/>
+              </a:buClr>
+              <a:buSzPts val="1100"/>
+              <a:buFont typeface="Arial"/>
+              <a:buNone/>
+            </a:pPr>
+            <a:r>
+              <a:rPr b="1" lang="en-GB" sz="1600">
+                <a:solidFill>
+                  <a:schemeClr val="dk2"/>
+                </a:solidFill>
+              </a:rPr>
+              <a:t>Project Success</a:t>
+            </a:r>
+            <a:r>
+              <a:rPr lang="en-GB" sz="1600">
+                <a:solidFill>
+                  <a:schemeClr val="dk2"/>
+                </a:solidFill>
+              </a:rPr>
+              <a:t>:</a:t>
+            </a:r>
+            <a:endParaRPr sz="1600">
+              <a:solidFill>
+                <a:schemeClr val="dk2"/>
+              </a:solidFill>
+            </a:endParaRPr>
+          </a:p>
+          <a:p>
+            <a:pPr indent="-330200" lvl="0" marL="457200" rtl="0" algn="l">
+              <a:spcBef>
+                <a:spcPts val="1200"/>
+              </a:spcBef>
+              <a:spcAft>
+                <a:spcPts val="0"/>
+              </a:spcAft>
+              <a:buClr>
+                <a:schemeClr val="dk2"/>
+              </a:buClr>
+              <a:buSzPts val="1600"/>
+              <a:buChar char="●"/>
+            </a:pPr>
+            <a:r>
+              <a:rPr lang="en-GB" sz="1600">
+                <a:solidFill>
+                  <a:schemeClr val="dk2"/>
+                </a:solidFill>
+              </a:rPr>
+              <a:t>Developed a robust predictive model that categorizes water pumps as functional, needing repair, or non-functional using data from Taarifa and the Tanzanian Ministry of Water.</a:t>
+            </a:r>
+            <a:endParaRPr sz="1600">
+              <a:solidFill>
+                <a:schemeClr val="dk2"/>
+              </a:solidFill>
+            </a:endParaRPr>
+          </a:p>
+          <a:p>
+            <a:pPr indent="-330200" lvl="0" marL="457200" rtl="0" algn="l">
+              <a:spcBef>
+                <a:spcPts val="1200"/>
+              </a:spcBef>
+              <a:spcAft>
+                <a:spcPts val="0"/>
+              </a:spcAft>
+              <a:buClr>
+                <a:schemeClr val="dk2"/>
+              </a:buClr>
+              <a:buSzPts val="1600"/>
+              <a:buChar char="●"/>
+            </a:pPr>
+            <a:r>
+              <a:rPr lang="en-GB" sz="1600">
+                <a:solidFill>
+                  <a:schemeClr val="dk2"/>
+                </a:solidFill>
+              </a:rPr>
+              <a:t>Provided predictive recommendations to improve water pump maintenance based on the model</a:t>
+            </a:r>
+            <a:endParaRPr sz="1600">
+              <a:solidFill>
+                <a:schemeClr val="dk2"/>
+              </a:solidFill>
+            </a:endParaRPr>
+          </a:p>
+          <a:p>
+            <a:pPr indent="-330200" lvl="0" marL="457200" rtl="0" algn="l">
+              <a:spcBef>
+                <a:spcPts val="1200"/>
+              </a:spcBef>
+              <a:spcAft>
+                <a:spcPts val="0"/>
+              </a:spcAft>
+              <a:buClr>
+                <a:schemeClr val="dk2"/>
+              </a:buClr>
+              <a:buSzPts val="1600"/>
+              <a:buChar char="●"/>
+            </a:pPr>
+            <a:r>
+              <a:rPr lang="en-GB" sz="1600">
+                <a:solidFill>
+                  <a:schemeClr val="dk2"/>
+                </a:solidFill>
+              </a:rPr>
+              <a:t>Directly addresses the need for effic</a:t>
+            </a:r>
+            <a:r>
+              <a:rPr lang="en-GB" sz="1600">
+                <a:solidFill>
+                  <a:schemeClr val="dk2"/>
+                </a:solidFill>
+              </a:rPr>
+              <a:t>i</a:t>
+            </a:r>
+            <a:r>
+              <a:rPr lang="en-GB" sz="1600">
+                <a:solidFill>
+                  <a:schemeClr val="dk2"/>
+                </a:solidFill>
+              </a:rPr>
+              <a:t>ent water pump maintenance in Tanzania.</a:t>
+            </a:r>
+            <a:endParaRPr sz="1600">
+              <a:solidFill>
+                <a:schemeClr val="dk2"/>
+              </a:solidFill>
+            </a:endParaRPr>
+          </a:p>
+          <a:p>
+            <a:pPr indent="0" lvl="0" marL="0" rtl="0" algn="l">
+              <a:spcBef>
+                <a:spcPts val="0"/>
+              </a:spcBef>
+              <a:spcAft>
+                <a:spcPts val="0"/>
+              </a:spcAft>
+              <a:buClr>
+                <a:schemeClr val="dk1"/>
+              </a:buClr>
+              <a:buSzPts val="1100"/>
+              <a:buFont typeface="Arial"/>
+              <a:buNone/>
+            </a:pPr>
+            <a:r>
+              <a:rPr b="1" lang="en-GB" sz="1600">
+                <a:solidFill>
+                  <a:schemeClr val="dk2"/>
+                </a:solidFill>
+              </a:rPr>
+              <a:t>Model Advantages</a:t>
+            </a:r>
+            <a:r>
+              <a:rPr lang="en-GB" sz="1600">
+                <a:solidFill>
+                  <a:schemeClr val="dk2"/>
+                </a:solidFill>
+              </a:rPr>
+              <a:t>:</a:t>
+            </a:r>
+            <a:endParaRPr sz="1600">
+              <a:solidFill>
+                <a:schemeClr val="dk2"/>
+              </a:solidFill>
+            </a:endParaRPr>
+          </a:p>
+          <a:p>
+            <a:pPr indent="-330200" lvl="0" marL="457200" rtl="0" algn="l">
+              <a:spcBef>
+                <a:spcPts val="1200"/>
+              </a:spcBef>
+              <a:spcAft>
+                <a:spcPts val="0"/>
+              </a:spcAft>
+              <a:buClr>
+                <a:schemeClr val="dk2"/>
+              </a:buClr>
+              <a:buSzPts val="1600"/>
+              <a:buChar char="●"/>
+            </a:pPr>
+            <a:r>
+              <a:rPr b="1" lang="en-GB" sz="1600">
+                <a:solidFill>
+                  <a:schemeClr val="dk2"/>
+                </a:solidFill>
+              </a:rPr>
+              <a:t>Accuracy</a:t>
+            </a:r>
+            <a:r>
+              <a:rPr lang="en-GB" sz="1600">
+                <a:solidFill>
+                  <a:schemeClr val="dk2"/>
+                </a:solidFill>
+              </a:rPr>
+              <a:t>: The Decision Tree Classifier delivers reliable predictions, essential for timely maintenance decisions.</a:t>
+            </a:r>
+            <a:endParaRPr sz="1600">
+              <a:solidFill>
+                <a:schemeClr val="dk2"/>
+              </a:solidFill>
+            </a:endParaRPr>
+          </a:p>
+          <a:p>
+            <a:pPr indent="-330200" lvl="0" marL="457200" rtl="0" algn="l">
+              <a:spcBef>
+                <a:spcPts val="1200"/>
+              </a:spcBef>
+              <a:spcAft>
+                <a:spcPts val="0"/>
+              </a:spcAft>
+              <a:buClr>
+                <a:schemeClr val="dk2"/>
+              </a:buClr>
+              <a:buSzPts val="1600"/>
+              <a:buChar char="●"/>
+            </a:pPr>
+            <a:r>
+              <a:rPr b="1" lang="en-GB" sz="1600">
+                <a:solidFill>
+                  <a:schemeClr val="dk2"/>
+                </a:solidFill>
+              </a:rPr>
+              <a:t>Efficiency</a:t>
+            </a:r>
+            <a:r>
+              <a:rPr lang="en-GB" sz="1600">
+                <a:solidFill>
+                  <a:schemeClr val="dk2"/>
+                </a:solidFill>
+              </a:rPr>
+              <a:t>: Enhances maintenance scheduling and reduces downtime, ensuring consistent water supply.</a:t>
+            </a:r>
+            <a:endParaRPr sz="1600">
+              <a:solidFill>
+                <a:schemeClr val="dk2"/>
+              </a:solidFill>
+            </a:endParaRPr>
+          </a:p>
+          <a:p>
+            <a:pPr indent="0" lvl="0" marL="0" rtl="0" algn="l">
+              <a:spcBef>
+                <a:spcPts val="0"/>
+              </a:spcBef>
+              <a:spcAft>
+                <a:spcPts val="0"/>
+              </a:spcAft>
+              <a:buNone/>
+            </a:pPr>
+            <a:r>
+              <a:t/>
+            </a:r>
+            <a:endParaRPr b="1" sz="1100">
               <a:solidFill>
                 <a:schemeClr val="dk2"/>
               </a:solidFill>
@@ -31946,6 +32669,272 @@
                 <a:schemeClr val="dk2"/>
               </a:solidFill>
             </a:endParaRPr>
+          </a:p>
+        </p:txBody>
+      </p:sp>
+    </p:spTree>
+  </p:cSld>
+  <p:clrMapOvr>
+    <a:masterClrMapping/>
+  </p:clrMapOvr>
+</p:sld>
+</file>
+
+<file path=ppt/slides/slide20.xml><?xml version="1.0" encoding="utf-8"?>
+<p:sld xmlns:a="http://schemas.openxmlformats.org/drawingml/2006/main" xmlns:r="http://schemas.openxmlformats.org/officeDocument/2006/relationships" xmlns:mc="http://schemas.openxmlformats.org/markup-compatibility/2006" xmlns:mv="urn:schemas-microsoft-com:mac:vml" xmlns:p="http://schemas.openxmlformats.org/presentationml/2006/main" xmlns:c="http://schemas.openxmlformats.org/drawingml/2006/chart" xmlns:dgm="http://schemas.openxmlformats.org/drawingml/2006/diagram" xmlns:o="urn:schemas-microsoft-com:office:office" xmlns:v="urn:schemas-microsoft-com:vml" xmlns:pvml="urn:schemas-microsoft-com:office:powerpoint" xmlns:com="http://schemas.openxmlformats.org/drawingml/2006/compatibility" xmlns:p14="http://schemas.microsoft.com/office/powerpoint/2010/main" xmlns:p15="http://schemas.microsoft.com/office/powerpoint/2012/main" xmlns:ahyp="http://schemas.microsoft.com/office/drawing/2018/hyperlinkcolor">
+  <p:cSld>
+    <p:spTree>
+      <p:nvGrpSpPr>
+        <p:cNvPr id="368" name="Shape 368"/>
+        <p:cNvGrpSpPr/>
+        <p:nvPr/>
+      </p:nvGrpSpPr>
+      <p:grpSpPr>
+        <a:xfrm>
+          <a:off x="0" y="0"/>
+          <a:ext cx="0" cy="0"/>
+          <a:chOff x="0" y="0"/>
+          <a:chExt cx="0" cy="0"/>
+        </a:xfrm>
+      </p:grpSpPr>
+      <p:sp>
+        <p:nvSpPr>
+          <p:cNvPr id="369" name="Google Shape;369;p50"/>
+          <p:cNvSpPr txBox="1"/>
+          <p:nvPr>
+            <p:ph type="title"/>
+          </p:nvPr>
+        </p:nvSpPr>
+        <p:spPr>
+          <a:xfrm>
+            <a:off x="720000" y="445025"/>
+            <a:ext cx="7704000" cy="572700"/>
+          </a:xfrm>
+          <a:prstGeom prst="rect">
+            <a:avLst/>
+          </a:prstGeom>
+        </p:spPr>
+        <p:txBody>
+          <a:bodyPr anchorCtr="0" anchor="ctr" bIns="91425" lIns="91425" spcFirstLastPara="1" rIns="91425" wrap="square" tIns="91425">
+            <a:noAutofit/>
+          </a:bodyPr>
+          <a:lstStyle/>
+          <a:p>
+            <a:pPr indent="0" lvl="0" marL="0" rtl="0" algn="l">
+              <a:spcBef>
+                <a:spcPts val="0"/>
+              </a:spcBef>
+              <a:spcAft>
+                <a:spcPts val="0"/>
+              </a:spcAft>
+              <a:buNone/>
+            </a:pPr>
+            <a:r>
+              <a:rPr lang="en-GB"/>
+              <a:t>10. Conclusion</a:t>
+            </a:r>
+            <a:endParaRPr/>
+          </a:p>
+        </p:txBody>
+      </p:sp>
+      <p:sp>
+        <p:nvSpPr>
+          <p:cNvPr id="370" name="Google Shape;370;p50"/>
+          <p:cNvSpPr txBox="1"/>
+          <p:nvPr>
+            <p:ph idx="1" type="body"/>
+          </p:nvPr>
+        </p:nvSpPr>
+        <p:spPr>
+          <a:xfrm>
+            <a:off x="720000" y="1152475"/>
+            <a:ext cx="7704000" cy="572700"/>
+          </a:xfrm>
+          <a:prstGeom prst="rect">
+            <a:avLst/>
+          </a:prstGeom>
+        </p:spPr>
+        <p:txBody>
+          <a:bodyPr anchorCtr="0" anchor="t" bIns="91425" lIns="91425" spcFirstLastPara="1" rIns="91425" wrap="square" tIns="91425">
+            <a:noAutofit/>
+          </a:bodyPr>
+          <a:lstStyle/>
+          <a:p>
+            <a:pPr indent="-336550" lvl="0" marL="457200" rtl="0" algn="l">
+              <a:spcBef>
+                <a:spcPts val="1200"/>
+              </a:spcBef>
+              <a:spcAft>
+                <a:spcPts val="0"/>
+              </a:spcAft>
+              <a:buClr>
+                <a:schemeClr val="dk2"/>
+              </a:buClr>
+              <a:buSzPts val="1700"/>
+              <a:buChar char="●"/>
+            </a:pPr>
+            <a:r>
+              <a:rPr b="1" lang="en-GB" sz="1700">
+                <a:solidFill>
+                  <a:schemeClr val="dk2"/>
+                </a:solidFill>
+              </a:rPr>
+              <a:t>Cost-Effectiveness</a:t>
+            </a:r>
+            <a:r>
+              <a:rPr lang="en-GB" sz="1700">
+                <a:solidFill>
+                  <a:schemeClr val="dk2"/>
+                </a:solidFill>
+              </a:rPr>
+              <a:t>: Optimizes resource allocation and minimizes expenses by identifying priority pumps for repair.</a:t>
+            </a:r>
+            <a:endParaRPr sz="1700">
+              <a:solidFill>
+                <a:schemeClr val="dk2"/>
+              </a:solidFill>
+            </a:endParaRPr>
+          </a:p>
+          <a:p>
+            <a:pPr indent="-336550" lvl="0" marL="457200" rtl="0" algn="l">
+              <a:spcBef>
+                <a:spcPts val="1200"/>
+              </a:spcBef>
+              <a:spcAft>
+                <a:spcPts val="0"/>
+              </a:spcAft>
+              <a:buClr>
+                <a:schemeClr val="dk2"/>
+              </a:buClr>
+              <a:buSzPts val="1700"/>
+              <a:buChar char="●"/>
+            </a:pPr>
+            <a:r>
+              <a:rPr b="1" lang="en-GB" sz="1700">
+                <a:solidFill>
+                  <a:schemeClr val="dk2"/>
+                </a:solidFill>
+              </a:rPr>
+              <a:t>Scalability</a:t>
+            </a:r>
+            <a:r>
+              <a:rPr lang="en-GB" sz="1700">
+                <a:solidFill>
+                  <a:schemeClr val="dk2"/>
+                </a:solidFill>
+              </a:rPr>
+              <a:t>: Easily adaptable to incorporate new data or features, supporting ongoing infrastructure management.</a:t>
+            </a:r>
+            <a:endParaRPr sz="1700">
+              <a:solidFill>
+                <a:schemeClr val="dk2"/>
+              </a:solidFill>
+            </a:endParaRPr>
+          </a:p>
+          <a:p>
+            <a:pPr indent="0" lvl="0" marL="0" rtl="0" algn="l">
+              <a:spcBef>
+                <a:spcPts val="0"/>
+              </a:spcBef>
+              <a:spcAft>
+                <a:spcPts val="0"/>
+              </a:spcAft>
+              <a:buClr>
+                <a:schemeClr val="dk1"/>
+              </a:buClr>
+              <a:buSzPts val="1100"/>
+              <a:buFont typeface="Arial"/>
+              <a:buNone/>
+            </a:pPr>
+            <a:r>
+              <a:rPr b="1" lang="en-GB" sz="1700">
+                <a:solidFill>
+                  <a:schemeClr val="dk2"/>
+                </a:solidFill>
+              </a:rPr>
+              <a:t>Stakeholder Value</a:t>
+            </a:r>
+            <a:r>
+              <a:rPr lang="en-GB" sz="1700">
+                <a:solidFill>
+                  <a:schemeClr val="dk2"/>
+                </a:solidFill>
+              </a:rPr>
+              <a:t>:</a:t>
+            </a:r>
+            <a:endParaRPr sz="1700">
+              <a:solidFill>
+                <a:schemeClr val="dk2"/>
+              </a:solidFill>
+            </a:endParaRPr>
+          </a:p>
+          <a:p>
+            <a:pPr indent="-336550" lvl="0" marL="457200" rtl="0" algn="l">
+              <a:spcBef>
+                <a:spcPts val="1200"/>
+              </a:spcBef>
+              <a:spcAft>
+                <a:spcPts val="0"/>
+              </a:spcAft>
+              <a:buClr>
+                <a:schemeClr val="dk2"/>
+              </a:buClr>
+              <a:buSzPts val="1700"/>
+              <a:buChar char="●"/>
+            </a:pPr>
+            <a:r>
+              <a:rPr b="1" lang="en-GB" sz="1700">
+                <a:solidFill>
+                  <a:schemeClr val="dk2"/>
+                </a:solidFill>
+              </a:rPr>
+              <a:t>For the Government</a:t>
+            </a:r>
+            <a:r>
+              <a:rPr lang="en-GB" sz="1700">
+                <a:solidFill>
+                  <a:schemeClr val="dk2"/>
+                </a:solidFill>
+              </a:rPr>
+              <a:t>: A critical tool for optimizing water infrastructure management and aligning with national goals for improved water access.</a:t>
+            </a:r>
+            <a:endParaRPr sz="1700">
+              <a:solidFill>
+                <a:schemeClr val="dk2"/>
+              </a:solidFill>
+            </a:endParaRPr>
+          </a:p>
+          <a:p>
+            <a:pPr indent="-336550" lvl="0" marL="457200" rtl="0" algn="l">
+              <a:spcBef>
+                <a:spcPts val="1200"/>
+              </a:spcBef>
+              <a:spcAft>
+                <a:spcPts val="0"/>
+              </a:spcAft>
+              <a:buClr>
+                <a:schemeClr val="dk2"/>
+              </a:buClr>
+              <a:buSzPts val="1700"/>
+              <a:buChar char="●"/>
+            </a:pPr>
+            <a:r>
+              <a:rPr b="1" lang="en-GB" sz="1700">
+                <a:solidFill>
+                  <a:schemeClr val="dk2"/>
+                </a:solidFill>
+              </a:rPr>
+              <a:t>For Citizens</a:t>
+            </a:r>
+            <a:r>
+              <a:rPr lang="en-GB" sz="1700">
+                <a:solidFill>
+                  <a:schemeClr val="dk2"/>
+                </a:solidFill>
+              </a:rPr>
+              <a:t>: Ensures reliable access to clean water, contributing to enhanced community well-being.</a:t>
+            </a:r>
+            <a:endParaRPr sz="2000"/>
           </a:p>
         </p:txBody>
       </p:sp>
@@ -33840,6 +34829,285 @@
 </file>
 
 <file path=ppt/theme/theme1.xml><?xml version="1.0" encoding="utf-8"?>
+<a:theme xmlns:a="http://schemas.openxmlformats.org/drawingml/2006/main" xmlns:r="http://schemas.openxmlformats.org/officeDocument/2006/relationships">
+  <a:themeElements>
+    <a:clrScheme name="Default">
+      <a:dk1>
+        <a:srgbClr val="000000"/>
+      </a:dk1>
+      <a:lt1>
+        <a:srgbClr val="FFFFFF"/>
+      </a:lt1>
+      <a:dk2>
+        <a:srgbClr val="158158"/>
+      </a:dk2>
+      <a:lt2>
+        <a:srgbClr val="F3F3F3"/>
+      </a:lt2>
+      <a:accent1>
+        <a:srgbClr val="058DC7"/>
+      </a:accent1>
+      <a:accent2>
+        <a:srgbClr val="50B432"/>
+      </a:accent2>
+      <a:accent3>
+        <a:srgbClr val="ED561B"/>
+      </a:accent3>
+      <a:accent4>
+        <a:srgbClr val="EDEF00"/>
+      </a:accent4>
+      <a:accent5>
+        <a:srgbClr val="24CBE5"/>
+      </a:accent5>
+      <a:accent6>
+        <a:srgbClr val="64E572"/>
+      </a:accent6>
+      <a:hlink>
+        <a:srgbClr val="2200CC"/>
+      </a:hlink>
+      <a:folHlink>
+        <a:srgbClr val="551A8B"/>
+      </a:folHlink>
+    </a:clrScheme>
+    <a:fontScheme name="Office">
+      <a:majorFont>
+        <a:latin typeface="Arial"/>
+        <a:ea typeface=""/>
+        <a:cs typeface=""/>
+        <a:font script="Jpan" typeface="ＭＳ Ｐゴシック"/>
+        <a:font script="Hang" typeface="맑은 고딕"/>
+        <a:font script="Hans" typeface="宋体"/>
+        <a:font script="Hant" typeface="新細明體"/>
+        <a:font script="Arab" typeface="Times New Roman"/>
+        <a:font script="Hebr" typeface="Times New Roman"/>
+        <a:font script="Thai" typeface="Angsana New"/>
+        <a:font script="Ethi" typeface="Nyala"/>
+        <a:font script="Beng" typeface="Vrinda"/>
+        <a:font script="Gujr" typeface="Shruti"/>
+        <a:font script="Khmr" typeface="MoolBoran"/>
+        <a:font script="Knda" typeface="Tunga"/>
+        <a:font script="Guru" typeface="Raavi"/>
+        <a:font script="Cans" typeface="Euphemia"/>
+        <a:font script="Cher" typeface="Plantagenet Cherokee"/>
+        <a:font script="Yiii" typeface="Microsoft Yi Baiti"/>
+        <a:font script="Tibt" typeface="Microsoft Himalaya"/>
+        <a:font script="Thaa" typeface="MV Boli"/>
+        <a:font script="Deva" typeface="Mangal"/>
+        <a:font script="Telu" typeface="Gautami"/>
+        <a:font script="Taml" typeface="Latha"/>
+        <a:font script="Syrc" typeface="Estrangelo Edessa"/>
+        <a:font script="Orya" typeface="Kalinga"/>
+        <a:font script="Mlym" typeface="Kartika"/>
+        <a:font script="Laoo" typeface="DokChampa"/>
+        <a:font script="Sinh" typeface="Iskoola Pota"/>
+        <a:font script="Mong" typeface="Mongolian Baiti"/>
+        <a:font script="Viet" typeface="Times New Roman"/>
+        <a:font script="Uigh" typeface="Microsoft Uighur"/>
+        <a:font script="Geor" typeface="Sylfaen"/>
+      </a:majorFont>
+      <a:minorFont>
+        <a:latin typeface="Arial"/>
+        <a:ea typeface=""/>
+        <a:cs typeface=""/>
+        <a:font script="Jpan" typeface="ＭＳ Ｐゴシック"/>
+        <a:font script="Hang" typeface="맑은 고딕"/>
+        <a:font script="Hans" typeface="宋体"/>
+        <a:font script="Hant" typeface="新細明體"/>
+        <a:font script="Arab" typeface="Arial"/>
+        <a:font script="Hebr" typeface="Arial"/>
+        <a:font script="Thai" typeface="Cordia New"/>
+        <a:font script="Ethi" typeface="Nyala"/>
+        <a:font script="Beng" typeface="Vrinda"/>
+        <a:font script="Gujr" typeface="Shruti"/>
+        <a:font script="Khmr" typeface="DaunPenh"/>
+        <a:font script="Knda" typeface="Tunga"/>
+        <a:font script="Guru" typeface="Raavi"/>
+        <a:font script="Cans" typeface="Euphemia"/>
+        <a:font script="Cher" typeface="Plantagenet Cherokee"/>
+        <a:font script="Yiii" typeface="Microsoft Yi Baiti"/>
+        <a:font script="Tibt" typeface="Microsoft Himalaya"/>
+        <a:font script="Thaa" typeface="MV Boli"/>
+        <a:font script="Deva" typeface="Mangal"/>
+        <a:font script="Telu" typeface="Gautami"/>
+        <a:font script="Taml" typeface="Latha"/>
+        <a:font script="Syrc" typeface="Estrangelo Edessa"/>
+        <a:font script="Orya" typeface="Kalinga"/>
+        <a:font script="Mlym" typeface="Kartika"/>
+        <a:font script="Laoo" typeface="DokChampa"/>
+        <a:font script="Sinh" typeface="Iskoola Pota"/>
+        <a:font script="Mong" typeface="Mongolian Baiti"/>
+        <a:font script="Viet" typeface="Arial"/>
+        <a:font script="Uigh" typeface="Microsoft Uighur"/>
+        <a:font script="Geor" typeface="Sylfaen"/>
+      </a:minorFont>
+    </a:fontScheme>
+    <a:fmtScheme name="Office">
+      <a:fillStyleLst>
+        <a:solidFill>
+          <a:schemeClr val="phClr"/>
+        </a:solidFill>
+        <a:gradFill rotWithShape="1">
+          <a:gsLst>
+            <a:gs pos="0">
+              <a:schemeClr val="phClr">
+                <a:tint val="50000"/>
+                <a:satMod val="300000"/>
+              </a:schemeClr>
+            </a:gs>
+            <a:gs pos="35000">
+              <a:schemeClr val="phClr">
+                <a:tint val="37000"/>
+                <a:satMod val="300000"/>
+              </a:schemeClr>
+            </a:gs>
+            <a:gs pos="100000">
+              <a:schemeClr val="phClr">
+                <a:tint val="15000"/>
+                <a:satMod val="350000"/>
+              </a:schemeClr>
+            </a:gs>
+          </a:gsLst>
+          <a:lin ang="16200000" scaled="1"/>
+        </a:gradFill>
+        <a:gradFill rotWithShape="1">
+          <a:gsLst>
+            <a:gs pos="0">
+              <a:schemeClr val="phClr">
+                <a:tint val="100000"/>
+                <a:shade val="100000"/>
+                <a:satMod val="130000"/>
+              </a:schemeClr>
+            </a:gs>
+            <a:gs pos="100000">
+              <a:schemeClr val="phClr">
+                <a:tint val="50000"/>
+                <a:shade val="100000"/>
+                <a:satMod val="350000"/>
+              </a:schemeClr>
+            </a:gs>
+          </a:gsLst>
+          <a:lin ang="16200000" scaled="0"/>
+        </a:gradFill>
+      </a:fillStyleLst>
+      <a:lnStyleLst>
+        <a:ln w="9525" cap="flat" cmpd="sng" algn="ctr">
+          <a:solidFill>
+            <a:schemeClr val="phClr">
+              <a:shade val="95000"/>
+              <a:satMod val="105000"/>
+            </a:schemeClr>
+          </a:solidFill>
+          <a:prstDash val="solid"/>
+        </a:ln>
+        <a:ln w="25400" cap="flat" cmpd="sng" algn="ctr">
+          <a:solidFill>
+            <a:schemeClr val="phClr"/>
+          </a:solidFill>
+          <a:prstDash val="solid"/>
+        </a:ln>
+        <a:ln w="38100" cap="flat" cmpd="sng" algn="ctr">
+          <a:solidFill>
+            <a:schemeClr val="phClr"/>
+          </a:solidFill>
+          <a:prstDash val="solid"/>
+        </a:ln>
+      </a:lnStyleLst>
+      <a:effectStyleLst>
+        <a:effectStyle>
+          <a:effectLst>
+            <a:outerShdw blurRad="40000" dist="20000" dir="5400000" rotWithShape="0">
+              <a:srgbClr val="000000">
+                <a:alpha val="38000"/>
+              </a:srgbClr>
+            </a:outerShdw>
+          </a:effectLst>
+        </a:effectStyle>
+        <a:effectStyle>
+          <a:effectLst>
+            <a:outerShdw blurRad="40000" dist="23000" dir="5400000" rotWithShape="0">
+              <a:srgbClr val="000000">
+                <a:alpha val="35000"/>
+              </a:srgbClr>
+            </a:outerShdw>
+          </a:effectLst>
+        </a:effectStyle>
+        <a:effectStyle>
+          <a:effectLst>
+            <a:outerShdw blurRad="40000" dist="23000" dir="5400000" rotWithShape="0">
+              <a:srgbClr val="000000">
+                <a:alpha val="35000"/>
+              </a:srgbClr>
+            </a:outerShdw>
+          </a:effectLst>
+          <a:scene3d>
+            <a:camera prst="orthographicFront">
+              <a:rot lat="0" lon="0" rev="0"/>
+            </a:camera>
+            <a:lightRig rig="threePt" dir="t">
+              <a:rot lat="0" lon="0" rev="1200000"/>
+            </a:lightRig>
+          </a:scene3d>
+          <a:sp3d>
+            <a:bevelT w="63500" h="25400"/>
+          </a:sp3d>
+        </a:effectStyle>
+      </a:effectStyleLst>
+      <a:bgFillStyleLst>
+        <a:solidFill>
+          <a:schemeClr val="phClr"/>
+        </a:solidFill>
+        <a:gradFill rotWithShape="1">
+          <a:gsLst>
+            <a:gs pos="0">
+              <a:schemeClr val="phClr">
+                <a:tint val="40000"/>
+                <a:satMod val="350000"/>
+              </a:schemeClr>
+            </a:gs>
+            <a:gs pos="40000">
+              <a:schemeClr val="phClr">
+                <a:tint val="45000"/>
+                <a:shade val="99000"/>
+                <a:satMod val="350000"/>
+              </a:schemeClr>
+            </a:gs>
+            <a:gs pos="100000">
+              <a:schemeClr val="phClr">
+                <a:shade val="20000"/>
+                <a:satMod val="255000"/>
+              </a:schemeClr>
+            </a:gs>
+          </a:gsLst>
+          <a:path path="circle">
+            <a:fillToRect l="50000" t="-80000" r="50000" b="180000"/>
+          </a:path>
+        </a:gradFill>
+        <a:gradFill rotWithShape="1">
+          <a:gsLst>
+            <a:gs pos="0">
+              <a:schemeClr val="phClr">
+                <a:tint val="80000"/>
+                <a:satMod val="300000"/>
+              </a:schemeClr>
+            </a:gs>
+            <a:gs pos="100000">
+              <a:schemeClr val="phClr">
+                <a:shade val="30000"/>
+                <a:satMod val="200000"/>
+              </a:schemeClr>
+            </a:gs>
+          </a:gsLst>
+          <a:path path="circle">
+            <a:fillToRect l="50000" t="50000" r="50000" b="50000"/>
+          </a:path>
+        </a:gradFill>
+      </a:bgFillStyleLst>
+    </a:fmtScheme>
+  </a:themeElements>
+</a:theme>
+</file>
+
+<file path=ppt/theme/theme2.xml><?xml version="1.0" encoding="utf-8"?>
 <a:theme xmlns:a="http://schemas.openxmlformats.org/drawingml/2006/main" xmlns:r="http://schemas.openxmlformats.org/officeDocument/2006/relationships" name="Simple Watery Shapes Style MK Campaign by Slidesgo">
   <a:themeElements>
     <a:clrScheme name="Simple Light">
@@ -34116,283 +35384,4 @@
     </a:fmtScheme>
   </a:themeElements>
 </a:theme>
-</file>
-
-<file path=ppt/theme/theme2.xml><?xml version="1.0" encoding="utf-8"?>
-<a:theme xmlns:a="http://schemas.openxmlformats.org/drawingml/2006/main" xmlns:r="http://schemas.openxmlformats.org/officeDocument/2006/relationships">
-  <a:themeElements>
-    <a:clrScheme name="Default">
-      <a:dk1>
-        <a:srgbClr val="000000"/>
-      </a:dk1>
-      <a:lt1>
-        <a:srgbClr val="FFFFFF"/>
-      </a:lt1>
-      <a:dk2>
-        <a:srgbClr val="158158"/>
-      </a:dk2>
-      <a:lt2>
-        <a:srgbClr val="F3F3F3"/>
-      </a:lt2>
-      <a:accent1>
-        <a:srgbClr val="058DC7"/>
-      </a:accent1>
-      <a:accent2>
-        <a:srgbClr val="50B432"/>
-      </a:accent2>
-      <a:accent3>
-        <a:srgbClr val="ED561B"/>
-      </a:accent3>
-      <a:accent4>
-        <a:srgbClr val="EDEF00"/>
-      </a:accent4>
-      <a:accent5>
-        <a:srgbClr val="24CBE5"/>
-      </a:accent5>
-      <a:accent6>
-        <a:srgbClr val="64E572"/>
-      </a:accent6>
-      <a:hlink>
-        <a:srgbClr val="2200CC"/>
-      </a:hlink>
-      <a:folHlink>
-        <a:srgbClr val="551A8B"/>
-      </a:folHlink>
-    </a:clrScheme>
-    <a:fontScheme name="Office">
-      <a:majorFont>
-        <a:latin typeface="Arial"/>
-        <a:ea typeface=""/>
-        <a:cs typeface=""/>
-        <a:font script="Jpan" typeface="ＭＳ Ｐゴシック"/>
-        <a:font script="Hang" typeface="맑은 고딕"/>
-        <a:font script="Hans" typeface="宋体"/>
-        <a:font script="Hant" typeface="新細明體"/>
-        <a:font script="Arab" typeface="Times New Roman"/>
-        <a:font script="Hebr" typeface="Times New Roman"/>
-        <a:font script="Thai" typeface="Angsana New"/>
-        <a:font script="Ethi" typeface="Nyala"/>
-        <a:font script="Beng" typeface="Vrinda"/>
-        <a:font script="Gujr" typeface="Shruti"/>
-        <a:font script="Khmr" typeface="MoolBoran"/>
-        <a:font script="Knda" typeface="Tunga"/>
-        <a:font script="Guru" typeface="Raavi"/>
-        <a:font script="Cans" typeface="Euphemia"/>
-        <a:font script="Cher" typeface="Plantagenet Cherokee"/>
-        <a:font script="Yiii" typeface="Microsoft Yi Baiti"/>
-        <a:font script="Tibt" typeface="Microsoft Himalaya"/>
-        <a:font script="Thaa" typeface="MV Boli"/>
-        <a:font script="Deva" typeface="Mangal"/>
-        <a:font script="Telu" typeface="Gautami"/>
-        <a:font script="Taml" typeface="Latha"/>
-        <a:font script="Syrc" typeface="Estrangelo Edessa"/>
-        <a:font script="Orya" typeface="Kalinga"/>
-        <a:font script="Mlym" typeface="Kartika"/>
-        <a:font script="Laoo" typeface="DokChampa"/>
-        <a:font script="Sinh" typeface="Iskoola Pota"/>
-        <a:font script="Mong" typeface="Mongolian Baiti"/>
-        <a:font script="Viet" typeface="Times New Roman"/>
-        <a:font script="Uigh" typeface="Microsoft Uighur"/>
-        <a:font script="Geor" typeface="Sylfaen"/>
-      </a:majorFont>
-      <a:minorFont>
-        <a:latin typeface="Arial"/>
-        <a:ea typeface=""/>
-        <a:cs typeface=""/>
-        <a:font script="Jpan" typeface="ＭＳ Ｐゴシック"/>
-        <a:font script="Hang" typeface="맑은 고딕"/>
-        <a:font script="Hans" typeface="宋体"/>
-        <a:font script="Hant" typeface="新細明體"/>
-        <a:font script="Arab" typeface="Arial"/>
-        <a:font script="Hebr" typeface="Arial"/>
-        <a:font script="Thai" typeface="Cordia New"/>
-        <a:font script="Ethi" typeface="Nyala"/>
-        <a:font script="Beng" typeface="Vrinda"/>
-        <a:font script="Gujr" typeface="Shruti"/>
-        <a:font script="Khmr" typeface="DaunPenh"/>
-        <a:font script="Knda" typeface="Tunga"/>
-        <a:font script="Guru" typeface="Raavi"/>
-        <a:font script="Cans" typeface="Euphemia"/>
-        <a:font script="Cher" typeface="Plantagenet Cherokee"/>
-        <a:font script="Yiii" typeface="Microsoft Yi Baiti"/>
-        <a:font script="Tibt" typeface="Microsoft Himalaya"/>
-        <a:font script="Thaa" typeface="MV Boli"/>
-        <a:font script="Deva" typeface="Mangal"/>
-        <a:font script="Telu" typeface="Gautami"/>
-        <a:font script="Taml" typeface="Latha"/>
-        <a:font script="Syrc" typeface="Estrangelo Edessa"/>
-        <a:font script="Orya" typeface="Kalinga"/>
-        <a:font script="Mlym" typeface="Kartika"/>
-        <a:font script="Laoo" typeface="DokChampa"/>
-        <a:font script="Sinh" typeface="Iskoola Pota"/>
-        <a:font script="Mong" typeface="Mongolian Baiti"/>
-        <a:font script="Viet" typeface="Arial"/>
-        <a:font script="Uigh" typeface="Microsoft Uighur"/>
-        <a:font script="Geor" typeface="Sylfaen"/>
-      </a:minorFont>
-    </a:fontScheme>
-    <a:fmtScheme name="Office">
-      <a:fillStyleLst>
-        <a:solidFill>
-          <a:schemeClr val="phClr"/>
-        </a:solidFill>
-        <a:gradFill rotWithShape="1">
-          <a:gsLst>
-            <a:gs pos="0">
-              <a:schemeClr val="phClr">
-                <a:tint val="50000"/>
-                <a:satMod val="300000"/>
-              </a:schemeClr>
-            </a:gs>
-            <a:gs pos="35000">
-              <a:schemeClr val="phClr">
-                <a:tint val="37000"/>
-                <a:satMod val="300000"/>
-              </a:schemeClr>
-            </a:gs>
-            <a:gs pos="100000">
-              <a:schemeClr val="phClr">
-                <a:tint val="15000"/>
-                <a:satMod val="350000"/>
-              </a:schemeClr>
-            </a:gs>
-          </a:gsLst>
-          <a:lin ang="16200000" scaled="1"/>
-        </a:gradFill>
-        <a:gradFill rotWithShape="1">
-          <a:gsLst>
-            <a:gs pos="0">
-              <a:schemeClr val="phClr">
-                <a:tint val="100000"/>
-                <a:shade val="100000"/>
-                <a:satMod val="130000"/>
-              </a:schemeClr>
-            </a:gs>
-            <a:gs pos="100000">
-              <a:schemeClr val="phClr">
-                <a:tint val="50000"/>
-                <a:shade val="100000"/>
-                <a:satMod val="350000"/>
-              </a:schemeClr>
-            </a:gs>
-          </a:gsLst>
-          <a:lin ang="16200000" scaled="0"/>
-        </a:gradFill>
-      </a:fillStyleLst>
-      <a:lnStyleLst>
-        <a:ln w="9525" cap="flat" cmpd="sng" algn="ctr">
-          <a:solidFill>
-            <a:schemeClr val="phClr">
-              <a:shade val="95000"/>
-              <a:satMod val="105000"/>
-            </a:schemeClr>
-          </a:solidFill>
-          <a:prstDash val="solid"/>
-        </a:ln>
-        <a:ln w="25400" cap="flat" cmpd="sng" algn="ctr">
-          <a:solidFill>
-            <a:schemeClr val="phClr"/>
-          </a:solidFill>
-          <a:prstDash val="solid"/>
-        </a:ln>
-        <a:ln w="38100" cap="flat" cmpd="sng" algn="ctr">
-          <a:solidFill>
-            <a:schemeClr val="phClr"/>
-          </a:solidFill>
-          <a:prstDash val="solid"/>
-        </a:ln>
-      </a:lnStyleLst>
-      <a:effectStyleLst>
-        <a:effectStyle>
-          <a:effectLst>
-            <a:outerShdw blurRad="40000" dist="20000" dir="5400000" rotWithShape="0">
-              <a:srgbClr val="000000">
-                <a:alpha val="38000"/>
-              </a:srgbClr>
-            </a:outerShdw>
-          </a:effectLst>
-        </a:effectStyle>
-        <a:effectStyle>
-          <a:effectLst>
-            <a:outerShdw blurRad="40000" dist="23000" dir="5400000" rotWithShape="0">
-              <a:srgbClr val="000000">
-                <a:alpha val="35000"/>
-              </a:srgbClr>
-            </a:outerShdw>
-          </a:effectLst>
-        </a:effectStyle>
-        <a:effectStyle>
-          <a:effectLst>
-            <a:outerShdw blurRad="40000" dist="23000" dir="5400000" rotWithShape="0">
-              <a:srgbClr val="000000">
-                <a:alpha val="35000"/>
-              </a:srgbClr>
-            </a:outerShdw>
-          </a:effectLst>
-          <a:scene3d>
-            <a:camera prst="orthographicFront">
-              <a:rot lat="0" lon="0" rev="0"/>
-            </a:camera>
-            <a:lightRig rig="threePt" dir="t">
-              <a:rot lat="0" lon="0" rev="1200000"/>
-            </a:lightRig>
-          </a:scene3d>
-          <a:sp3d>
-            <a:bevelT w="63500" h="25400"/>
-          </a:sp3d>
-        </a:effectStyle>
-      </a:effectStyleLst>
-      <a:bgFillStyleLst>
-        <a:solidFill>
-          <a:schemeClr val="phClr"/>
-        </a:solidFill>
-        <a:gradFill rotWithShape="1">
-          <a:gsLst>
-            <a:gs pos="0">
-              <a:schemeClr val="phClr">
-                <a:tint val="40000"/>
-                <a:satMod val="350000"/>
-              </a:schemeClr>
-            </a:gs>
-            <a:gs pos="40000">
-              <a:schemeClr val="phClr">
-                <a:tint val="45000"/>
-                <a:shade val="99000"/>
-                <a:satMod val="350000"/>
-              </a:schemeClr>
-            </a:gs>
-            <a:gs pos="100000">
-              <a:schemeClr val="phClr">
-                <a:shade val="20000"/>
-                <a:satMod val="255000"/>
-              </a:schemeClr>
-            </a:gs>
-          </a:gsLst>
-          <a:path path="circle">
-            <a:fillToRect l="50000" t="-80000" r="50000" b="180000"/>
-          </a:path>
-        </a:gradFill>
-        <a:gradFill rotWithShape="1">
-          <a:gsLst>
-            <a:gs pos="0">
-              <a:schemeClr val="phClr">
-                <a:tint val="80000"/>
-                <a:satMod val="300000"/>
-              </a:schemeClr>
-            </a:gs>
-            <a:gs pos="100000">
-              <a:schemeClr val="phClr">
-                <a:shade val="30000"/>
-                <a:satMod val="200000"/>
-              </a:schemeClr>
-            </a:gs>
-          </a:gsLst>
-          <a:path path="circle">
-            <a:fillToRect l="50000" t="50000" r="50000" b="50000"/>
-          </a:path>
-        </a:gradFill>
-      </a:bgFillStyleLst>
-    </a:fmtScheme>
-  </a:themeElements>
-</a:theme>
 </file>
</xml_diff>